<commit_message>
support 2 : added examples
</commit_message>
<xml_diff>
--- a/support 2 - At the beginning of mathematical objects/At the beginning of mathematical objects.pptx
+++ b/support 2 - At the beginning of mathematical objects/At the beginning of mathematical objects.pptx
@@ -4,6 +4,12 @@
   <p:sldMasterIdLst>
     <p:sldMasterId id="2147483648" r:id="rId1"/>
   </p:sldMasterIdLst>
+  <p:notesMasterIdLst>
+    <p:notesMasterId r:id="rId17"/>
+  </p:notesMasterIdLst>
+  <p:handoutMasterIdLst>
+    <p:handoutMasterId r:id="rId18"/>
+  </p:handoutMasterIdLst>
   <p:sldIdLst>
     <p:sldId id="256" r:id="rId2"/>
     <p:sldId id="257" r:id="rId3"/>
@@ -15,10 +21,11 @@
     <p:sldId id="264" r:id="rId9"/>
     <p:sldId id="266" r:id="rId10"/>
     <p:sldId id="265" r:id="rId11"/>
-    <p:sldId id="268" r:id="rId12"/>
-    <p:sldId id="263" r:id="rId13"/>
-    <p:sldId id="267" r:id="rId14"/>
-    <p:sldId id="269" r:id="rId15"/>
+    <p:sldId id="270" r:id="rId12"/>
+    <p:sldId id="268" r:id="rId13"/>
+    <p:sldId id="263" r:id="rId14"/>
+    <p:sldId id="267" r:id="rId15"/>
+    <p:sldId id="269" r:id="rId16"/>
   </p:sldIdLst>
   <p:sldSz cx="12192000" cy="6858000"/>
   <p:notesSz cx="6858000" cy="9144000"/>
@@ -117,7 +124,529 @@
       </a:defRPr>
     </a:lvl9pPr>
   </p:defaultTextStyle>
+  <p:extLst>
+    <p:ext uri="{EFAFB233-063F-42B5-8137-9DF3F51BA10A}">
+      <p15:sldGuideLst xmlns:p15="http://schemas.microsoft.com/office/powerpoint/2012/main"/>
+    </p:ext>
+  </p:extLst>
 </p:presentation>
+</file>
+
+<file path=ppt/handoutMasters/handoutMaster1.xml><?xml version="1.0" encoding="utf-8"?>
+<p:handoutMaster xmlns:a="http://schemas.openxmlformats.org/drawingml/2006/main" xmlns:r="http://schemas.openxmlformats.org/officeDocument/2006/relationships" xmlns:p="http://schemas.openxmlformats.org/presentationml/2006/main">
+  <p:cSld>
+    <p:bg>
+      <p:bgRef idx="1001">
+        <a:schemeClr val="bg1"/>
+      </p:bgRef>
+    </p:bg>
+    <p:spTree>
+      <p:nvGrpSpPr>
+        <p:cNvPr id="1" name=""/>
+        <p:cNvGrpSpPr/>
+        <p:nvPr/>
+      </p:nvGrpSpPr>
+      <p:grpSpPr>
+        <a:xfrm>
+          <a:off x="0" y="0"/>
+          <a:ext cx="0" cy="0"/>
+          <a:chOff x="0" y="0"/>
+          <a:chExt cx="0" cy="0"/>
+        </a:xfrm>
+      </p:grpSpPr>
+      <p:sp>
+        <p:nvSpPr>
+          <p:cNvPr id="2" name="Espace réservé de l'en-tête 1"/>
+          <p:cNvSpPr>
+            <a:spLocks noGrp="1"/>
+          </p:cNvSpPr>
+          <p:nvPr>
+            <p:ph type="hdr" sz="quarter"/>
+          </p:nvPr>
+        </p:nvSpPr>
+        <p:spPr>
+          <a:xfrm>
+            <a:off x="0" y="0"/>
+            <a:ext cx="2971800" cy="458788"/>
+          </a:xfrm>
+          <a:prstGeom prst="rect">
+            <a:avLst/>
+          </a:prstGeom>
+        </p:spPr>
+        <p:txBody>
+          <a:bodyPr vert="horz" lIns="91440" tIns="45720" rIns="91440" bIns="45720" rtlCol="0"/>
+          <a:lstStyle>
+            <a:lvl1pPr algn="l">
+              <a:defRPr sz="1200"/>
+            </a:lvl1pPr>
+          </a:lstStyle>
+          <a:p>
+            <a:endParaRPr lang="fr-FR"/>
+          </a:p>
+        </p:txBody>
+      </p:sp>
+      <p:sp>
+        <p:nvSpPr>
+          <p:cNvPr id="3" name="Espace réservé de la date 2"/>
+          <p:cNvSpPr>
+            <a:spLocks noGrp="1"/>
+          </p:cNvSpPr>
+          <p:nvPr>
+            <p:ph type="dt" sz="quarter" idx="1"/>
+          </p:nvPr>
+        </p:nvSpPr>
+        <p:spPr>
+          <a:xfrm>
+            <a:off x="3884613" y="0"/>
+            <a:ext cx="2971800" cy="458788"/>
+          </a:xfrm>
+          <a:prstGeom prst="rect">
+            <a:avLst/>
+          </a:prstGeom>
+        </p:spPr>
+        <p:txBody>
+          <a:bodyPr vert="horz" lIns="91440" tIns="45720" rIns="91440" bIns="45720" rtlCol="0"/>
+          <a:lstStyle>
+            <a:lvl1pPr algn="r">
+              <a:defRPr sz="1200"/>
+            </a:lvl1pPr>
+          </a:lstStyle>
+          <a:p>
+            <a:fld id="{4F4ABD04-B273-4B55-990D-42F6F8F3CFCA}" type="datetimeFigureOut">
+              <a:rPr lang="fr-FR" smtClean="0"/>
+              <a:t>09/12/2015</a:t>
+            </a:fld>
+            <a:endParaRPr lang="fr-FR"/>
+          </a:p>
+        </p:txBody>
+      </p:sp>
+      <p:sp>
+        <p:nvSpPr>
+          <p:cNvPr id="4" name="Espace réservé du pied de page 3"/>
+          <p:cNvSpPr>
+            <a:spLocks noGrp="1"/>
+          </p:cNvSpPr>
+          <p:nvPr>
+            <p:ph type="ftr" sz="quarter" idx="2"/>
+          </p:nvPr>
+        </p:nvSpPr>
+        <p:spPr>
+          <a:xfrm>
+            <a:off x="0" y="8685213"/>
+            <a:ext cx="2971800" cy="458787"/>
+          </a:xfrm>
+          <a:prstGeom prst="rect">
+            <a:avLst/>
+          </a:prstGeom>
+        </p:spPr>
+        <p:txBody>
+          <a:bodyPr vert="horz" lIns="91440" tIns="45720" rIns="91440" bIns="45720" rtlCol="0" anchor="b"/>
+          <a:lstStyle>
+            <a:lvl1pPr algn="l">
+              <a:defRPr sz="1200"/>
+            </a:lvl1pPr>
+          </a:lstStyle>
+          <a:p>
+            <a:endParaRPr lang="fr-FR"/>
+          </a:p>
+        </p:txBody>
+      </p:sp>
+      <p:sp>
+        <p:nvSpPr>
+          <p:cNvPr id="5" name="Espace réservé du numéro de diapositive 4"/>
+          <p:cNvSpPr>
+            <a:spLocks noGrp="1"/>
+          </p:cNvSpPr>
+          <p:nvPr>
+            <p:ph type="sldNum" sz="quarter" idx="3"/>
+          </p:nvPr>
+        </p:nvSpPr>
+        <p:spPr>
+          <a:xfrm>
+            <a:off x="3884613" y="8685213"/>
+            <a:ext cx="2971800" cy="458787"/>
+          </a:xfrm>
+          <a:prstGeom prst="rect">
+            <a:avLst/>
+          </a:prstGeom>
+        </p:spPr>
+        <p:txBody>
+          <a:bodyPr vert="horz" lIns="91440" tIns="45720" rIns="91440" bIns="45720" rtlCol="0" anchor="b"/>
+          <a:lstStyle>
+            <a:lvl1pPr algn="r">
+              <a:defRPr sz="1200"/>
+            </a:lvl1pPr>
+          </a:lstStyle>
+          <a:p>
+            <a:fld id="{7D95F8E7-F30D-49A9-A3D5-3E6988A47C9C}" type="slidenum">
+              <a:rPr lang="fr-FR" smtClean="0"/>
+              <a:t>‹N°›</a:t>
+            </a:fld>
+            <a:endParaRPr lang="fr-FR"/>
+          </a:p>
+        </p:txBody>
+      </p:sp>
+    </p:spTree>
+    <p:extLst>
+      <p:ext uri="{BB962C8B-B14F-4D97-AF65-F5344CB8AC3E}">
+        <p14:creationId xmlns:p14="http://schemas.microsoft.com/office/powerpoint/2010/main" val="278837392"/>
+      </p:ext>
+    </p:extLst>
+  </p:cSld>
+  <p:clrMap bg1="lt1" tx1="dk1" bg2="lt2" tx2="dk2" accent1="accent1" accent2="accent2" accent3="accent3" accent4="accent4" accent5="accent5" accent6="accent6" hlink="hlink" folHlink="folHlink"/>
+  <p:hf hdr="0" ftr="0" dt="0"/>
+</p:handoutMaster>
+</file>
+
+<file path=ppt/notesMasters/notesMaster1.xml><?xml version="1.0" encoding="utf-8"?>
+<p:notesMaster xmlns:a="http://schemas.openxmlformats.org/drawingml/2006/main" xmlns:r="http://schemas.openxmlformats.org/officeDocument/2006/relationships" xmlns:p="http://schemas.openxmlformats.org/presentationml/2006/main">
+  <p:cSld>
+    <p:bg>
+      <p:bgRef idx="1001">
+        <a:schemeClr val="bg1"/>
+      </p:bgRef>
+    </p:bg>
+    <p:spTree>
+      <p:nvGrpSpPr>
+        <p:cNvPr id="1" name=""/>
+        <p:cNvGrpSpPr/>
+        <p:nvPr/>
+      </p:nvGrpSpPr>
+      <p:grpSpPr>
+        <a:xfrm>
+          <a:off x="0" y="0"/>
+          <a:ext cx="0" cy="0"/>
+          <a:chOff x="0" y="0"/>
+          <a:chExt cx="0" cy="0"/>
+        </a:xfrm>
+      </p:grpSpPr>
+      <p:sp>
+        <p:nvSpPr>
+          <p:cNvPr id="2" name="Espace réservé de l'en-tête 1"/>
+          <p:cNvSpPr>
+            <a:spLocks noGrp="1"/>
+          </p:cNvSpPr>
+          <p:nvPr>
+            <p:ph type="hdr" sz="quarter"/>
+          </p:nvPr>
+        </p:nvSpPr>
+        <p:spPr>
+          <a:xfrm>
+            <a:off x="0" y="0"/>
+            <a:ext cx="2971800" cy="458788"/>
+          </a:xfrm>
+          <a:prstGeom prst="rect">
+            <a:avLst/>
+          </a:prstGeom>
+        </p:spPr>
+        <p:txBody>
+          <a:bodyPr vert="horz" lIns="91440" tIns="45720" rIns="91440" bIns="45720" rtlCol="0"/>
+          <a:lstStyle>
+            <a:lvl1pPr algn="l">
+              <a:defRPr sz="1200"/>
+            </a:lvl1pPr>
+          </a:lstStyle>
+          <a:p>
+            <a:endParaRPr lang="fr-FR"/>
+          </a:p>
+        </p:txBody>
+      </p:sp>
+      <p:sp>
+        <p:nvSpPr>
+          <p:cNvPr id="3" name="Espace réservé de la date 2"/>
+          <p:cNvSpPr>
+            <a:spLocks noGrp="1"/>
+          </p:cNvSpPr>
+          <p:nvPr>
+            <p:ph type="dt" idx="1"/>
+          </p:nvPr>
+        </p:nvSpPr>
+        <p:spPr>
+          <a:xfrm>
+            <a:off x="3884613" y="0"/>
+            <a:ext cx="2971800" cy="458788"/>
+          </a:xfrm>
+          <a:prstGeom prst="rect">
+            <a:avLst/>
+          </a:prstGeom>
+        </p:spPr>
+        <p:txBody>
+          <a:bodyPr vert="horz" lIns="91440" tIns="45720" rIns="91440" bIns="45720" rtlCol="0"/>
+          <a:lstStyle>
+            <a:lvl1pPr algn="r">
+              <a:defRPr sz="1200"/>
+            </a:lvl1pPr>
+          </a:lstStyle>
+          <a:p>
+            <a:fld id="{808ADFD9-8EC6-4EEB-8EE7-9DD0B6B40948}" type="datetimeFigureOut">
+              <a:rPr lang="fr-FR" smtClean="0"/>
+              <a:t>09/12/2015</a:t>
+            </a:fld>
+            <a:endParaRPr lang="fr-FR"/>
+          </a:p>
+        </p:txBody>
+      </p:sp>
+      <p:sp>
+        <p:nvSpPr>
+          <p:cNvPr id="4" name="Espace réservé de l'image des diapositives 3"/>
+          <p:cNvSpPr>
+            <a:spLocks noGrp="1" noRot="1" noChangeAspect="1"/>
+          </p:cNvSpPr>
+          <p:nvPr>
+            <p:ph type="sldImg" idx="2"/>
+          </p:nvPr>
+        </p:nvSpPr>
+        <p:spPr>
+          <a:xfrm>
+            <a:off x="685800" y="1143000"/>
+            <a:ext cx="5486400" cy="3086100"/>
+          </a:xfrm>
+          <a:prstGeom prst="rect">
+            <a:avLst/>
+          </a:prstGeom>
+          <a:noFill/>
+          <a:ln w="12700">
+            <a:solidFill>
+              <a:prstClr val="black"/>
+            </a:solidFill>
+          </a:ln>
+        </p:spPr>
+        <p:txBody>
+          <a:bodyPr vert="horz" lIns="91440" tIns="45720" rIns="91440" bIns="45720" rtlCol="0" anchor="ctr"/>
+          <a:lstStyle/>
+          <a:p>
+            <a:endParaRPr lang="fr-FR"/>
+          </a:p>
+        </p:txBody>
+      </p:sp>
+      <p:sp>
+        <p:nvSpPr>
+          <p:cNvPr id="5" name="Espace réservé des notes 4"/>
+          <p:cNvSpPr>
+            <a:spLocks noGrp="1"/>
+          </p:cNvSpPr>
+          <p:nvPr>
+            <p:ph type="body" sz="quarter" idx="3"/>
+          </p:nvPr>
+        </p:nvSpPr>
+        <p:spPr>
+          <a:xfrm>
+            <a:off x="685800" y="4400550"/>
+            <a:ext cx="5486400" cy="3600450"/>
+          </a:xfrm>
+          <a:prstGeom prst="rect">
+            <a:avLst/>
+          </a:prstGeom>
+        </p:spPr>
+        <p:txBody>
+          <a:bodyPr vert="horz" lIns="91440" tIns="45720" rIns="91440" bIns="45720" rtlCol="0"/>
+          <a:lstStyle/>
+          <a:p>
+            <a:pPr lvl="0"/>
+            <a:r>
+              <a:rPr lang="fr-FR" smtClean="0"/>
+              <a:t>Modifier les styles du texte du masque</a:t>
+            </a:r>
+          </a:p>
+          <a:p>
+            <a:pPr lvl="1"/>
+            <a:r>
+              <a:rPr lang="fr-FR" smtClean="0"/>
+              <a:t>Deuxième niveau</a:t>
+            </a:r>
+          </a:p>
+          <a:p>
+            <a:pPr lvl="2"/>
+            <a:r>
+              <a:rPr lang="fr-FR" smtClean="0"/>
+              <a:t>Troisième niveau</a:t>
+            </a:r>
+          </a:p>
+          <a:p>
+            <a:pPr lvl="3"/>
+            <a:r>
+              <a:rPr lang="fr-FR" smtClean="0"/>
+              <a:t>Quatrième niveau</a:t>
+            </a:r>
+          </a:p>
+          <a:p>
+            <a:pPr lvl="4"/>
+            <a:r>
+              <a:rPr lang="fr-FR" smtClean="0"/>
+              <a:t>Cinquième niveau</a:t>
+            </a:r>
+            <a:endParaRPr lang="fr-FR"/>
+          </a:p>
+        </p:txBody>
+      </p:sp>
+      <p:sp>
+        <p:nvSpPr>
+          <p:cNvPr id="6" name="Espace réservé du pied de page 5"/>
+          <p:cNvSpPr>
+            <a:spLocks noGrp="1"/>
+          </p:cNvSpPr>
+          <p:nvPr>
+            <p:ph type="ftr" sz="quarter" idx="4"/>
+          </p:nvPr>
+        </p:nvSpPr>
+        <p:spPr>
+          <a:xfrm>
+            <a:off x="0" y="8685213"/>
+            <a:ext cx="2971800" cy="458787"/>
+          </a:xfrm>
+          <a:prstGeom prst="rect">
+            <a:avLst/>
+          </a:prstGeom>
+        </p:spPr>
+        <p:txBody>
+          <a:bodyPr vert="horz" lIns="91440" tIns="45720" rIns="91440" bIns="45720" rtlCol="0" anchor="b"/>
+          <a:lstStyle>
+            <a:lvl1pPr algn="l">
+              <a:defRPr sz="1200"/>
+            </a:lvl1pPr>
+          </a:lstStyle>
+          <a:p>
+            <a:endParaRPr lang="fr-FR"/>
+          </a:p>
+        </p:txBody>
+      </p:sp>
+      <p:sp>
+        <p:nvSpPr>
+          <p:cNvPr id="7" name="Espace réservé du numéro de diapositive 6"/>
+          <p:cNvSpPr>
+            <a:spLocks noGrp="1"/>
+          </p:cNvSpPr>
+          <p:nvPr>
+            <p:ph type="sldNum" sz="quarter" idx="5"/>
+          </p:nvPr>
+        </p:nvSpPr>
+        <p:spPr>
+          <a:xfrm>
+            <a:off x="3884613" y="8685213"/>
+            <a:ext cx="2971800" cy="458787"/>
+          </a:xfrm>
+          <a:prstGeom prst="rect">
+            <a:avLst/>
+          </a:prstGeom>
+        </p:spPr>
+        <p:txBody>
+          <a:bodyPr vert="horz" lIns="91440" tIns="45720" rIns="91440" bIns="45720" rtlCol="0" anchor="b"/>
+          <a:lstStyle>
+            <a:lvl1pPr algn="r">
+              <a:defRPr sz="1200"/>
+            </a:lvl1pPr>
+          </a:lstStyle>
+          <a:p>
+            <a:fld id="{93F67EB6-DA26-4CBE-AAE3-87DB6F26F5C5}" type="slidenum">
+              <a:rPr lang="fr-FR" smtClean="0"/>
+              <a:t>‹N°›</a:t>
+            </a:fld>
+            <a:endParaRPr lang="fr-FR"/>
+          </a:p>
+        </p:txBody>
+      </p:sp>
+    </p:spTree>
+    <p:extLst>
+      <p:ext uri="{BB962C8B-B14F-4D97-AF65-F5344CB8AC3E}">
+        <p14:creationId xmlns:p14="http://schemas.microsoft.com/office/powerpoint/2010/main" val="3368740740"/>
+      </p:ext>
+    </p:extLst>
+  </p:cSld>
+  <p:clrMap bg1="lt1" tx1="dk1" bg2="lt2" tx2="dk2" accent1="accent1" accent2="accent2" accent3="accent3" accent4="accent4" accent5="accent5" accent6="accent6" hlink="hlink" folHlink="folHlink"/>
+  <p:hf hdr="0" ftr="0" dt="0"/>
+  <p:notesStyle>
+    <a:lvl1pPr marL="0" algn="l" defTabSz="914400" rtl="0" eaLnBrk="1" latinLnBrk="0" hangingPunct="1">
+      <a:defRPr sz="1200" kern="1200">
+        <a:solidFill>
+          <a:schemeClr val="tx1"/>
+        </a:solidFill>
+        <a:latin typeface="+mn-lt"/>
+        <a:ea typeface="+mn-ea"/>
+        <a:cs typeface="+mn-cs"/>
+      </a:defRPr>
+    </a:lvl1pPr>
+    <a:lvl2pPr marL="457200" algn="l" defTabSz="914400" rtl="0" eaLnBrk="1" latinLnBrk="0" hangingPunct="1">
+      <a:defRPr sz="1200" kern="1200">
+        <a:solidFill>
+          <a:schemeClr val="tx1"/>
+        </a:solidFill>
+        <a:latin typeface="+mn-lt"/>
+        <a:ea typeface="+mn-ea"/>
+        <a:cs typeface="+mn-cs"/>
+      </a:defRPr>
+    </a:lvl2pPr>
+    <a:lvl3pPr marL="914400" algn="l" defTabSz="914400" rtl="0" eaLnBrk="1" latinLnBrk="0" hangingPunct="1">
+      <a:defRPr sz="1200" kern="1200">
+        <a:solidFill>
+          <a:schemeClr val="tx1"/>
+        </a:solidFill>
+        <a:latin typeface="+mn-lt"/>
+        <a:ea typeface="+mn-ea"/>
+        <a:cs typeface="+mn-cs"/>
+      </a:defRPr>
+    </a:lvl3pPr>
+    <a:lvl4pPr marL="1371600" algn="l" defTabSz="914400" rtl="0" eaLnBrk="1" latinLnBrk="0" hangingPunct="1">
+      <a:defRPr sz="1200" kern="1200">
+        <a:solidFill>
+          <a:schemeClr val="tx1"/>
+        </a:solidFill>
+        <a:latin typeface="+mn-lt"/>
+        <a:ea typeface="+mn-ea"/>
+        <a:cs typeface="+mn-cs"/>
+      </a:defRPr>
+    </a:lvl4pPr>
+    <a:lvl5pPr marL="1828800" algn="l" defTabSz="914400" rtl="0" eaLnBrk="1" latinLnBrk="0" hangingPunct="1">
+      <a:defRPr sz="1200" kern="1200">
+        <a:solidFill>
+          <a:schemeClr val="tx1"/>
+        </a:solidFill>
+        <a:latin typeface="+mn-lt"/>
+        <a:ea typeface="+mn-ea"/>
+        <a:cs typeface="+mn-cs"/>
+      </a:defRPr>
+    </a:lvl5pPr>
+    <a:lvl6pPr marL="2286000" algn="l" defTabSz="914400" rtl="0" eaLnBrk="1" latinLnBrk="0" hangingPunct="1">
+      <a:defRPr sz="1200" kern="1200">
+        <a:solidFill>
+          <a:schemeClr val="tx1"/>
+        </a:solidFill>
+        <a:latin typeface="+mn-lt"/>
+        <a:ea typeface="+mn-ea"/>
+        <a:cs typeface="+mn-cs"/>
+      </a:defRPr>
+    </a:lvl6pPr>
+    <a:lvl7pPr marL="2743200" algn="l" defTabSz="914400" rtl="0" eaLnBrk="1" latinLnBrk="0" hangingPunct="1">
+      <a:defRPr sz="1200" kern="1200">
+        <a:solidFill>
+          <a:schemeClr val="tx1"/>
+        </a:solidFill>
+        <a:latin typeface="+mn-lt"/>
+        <a:ea typeface="+mn-ea"/>
+        <a:cs typeface="+mn-cs"/>
+      </a:defRPr>
+    </a:lvl7pPr>
+    <a:lvl8pPr marL="3200400" algn="l" defTabSz="914400" rtl="0" eaLnBrk="1" latinLnBrk="0" hangingPunct="1">
+      <a:defRPr sz="1200" kern="1200">
+        <a:solidFill>
+          <a:schemeClr val="tx1"/>
+        </a:solidFill>
+        <a:latin typeface="+mn-lt"/>
+        <a:ea typeface="+mn-ea"/>
+        <a:cs typeface="+mn-cs"/>
+      </a:defRPr>
+    </a:lvl8pPr>
+    <a:lvl9pPr marL="3657600" algn="l" defTabSz="914400" rtl="0" eaLnBrk="1" latinLnBrk="0" hangingPunct="1">
+      <a:defRPr sz="1200" kern="1200">
+        <a:solidFill>
+          <a:schemeClr val="tx1"/>
+        </a:solidFill>
+        <a:latin typeface="+mn-lt"/>
+        <a:ea typeface="+mn-ea"/>
+        <a:cs typeface="+mn-cs"/>
+      </a:defRPr>
+    </a:lvl9pPr>
+  </p:notesStyle>
+</p:notesMaster>
 </file>
 
 <file path=ppt/slideLayouts/slideLayout1.xml><?xml version="1.0" encoding="utf-8"?>
@@ -215,7 +744,7 @@
           <a:effectLst/>
           <a:extLst>
             <a:ext uri="{91240B29-F687-4f45-9708-019B960494DF}">
-              <a14:hiddenLine xmlns:a14="http://schemas.microsoft.com/office/drawing/2010/main" xmlns="" w="9525">
+              <a14:hiddenLine xmlns="" xmlns:a14="http://schemas.microsoft.com/office/drawing/2010/main" w="9525">
                 <a:solidFill>
                   <a:srgbClr val="000000"/>
                 </a:solidFill>
@@ -405,10 +934,9 @@
           <a:bodyPr/>
           <a:lstStyle/>
           <a:p>
-            <a:fld id="{08B9EBBA-996F-894A-B54A-D6246ED52CEA}" type="datetimeFigureOut">
-              <a:rPr lang="en-US" dirty="0"/>
-              <a:pPr/>
-              <a:t>12/8/2015</a:t>
+            <a:fld id="{39E0FA6F-5D15-4DF3-9AA0-664D7AC40DDC}" type="datetime1">
+              <a:rPr lang="en-US" smtClean="0"/>
+              <a:t>12/9/2015</a:t>
             </a:fld>
             <a:endParaRPr lang="en-US" dirty="0"/>
           </a:p>
@@ -720,10 +1248,9 @@
           <a:bodyPr/>
           <a:lstStyle/>
           <a:p>
-            <a:fld id="{18C79C5D-2A6F-F04D-97DA-BEF2467B64E4}" type="datetimeFigureOut">
-              <a:rPr lang="en-US" dirty="0"/>
-              <a:pPr/>
-              <a:t>12/8/2015</a:t>
+            <a:fld id="{DE6A9E07-CEF9-404E-8ECD-2AA66C6DF012}" type="datetime1">
+              <a:rPr lang="en-US" smtClean="0"/>
+              <a:t>12/9/2015</a:t>
             </a:fld>
             <a:endParaRPr lang="en-US" dirty="0"/>
           </a:p>
@@ -1205,10 +1732,9 @@
           <a:bodyPr/>
           <a:lstStyle/>
           <a:p>
-            <a:fld id="{8DFA1846-DA80-1C48-A609-854EA85C59AD}" type="datetimeFigureOut">
-              <a:rPr lang="en-US" dirty="0"/>
-              <a:pPr/>
-              <a:t>12/8/2015</a:t>
+            <a:fld id="{08B9A4B9-B3B6-4713-8412-DE37F7B387E5}" type="datetime1">
+              <a:rPr lang="en-US" smtClean="0"/>
+              <a:t>12/9/2015</a:t>
             </a:fld>
             <a:endParaRPr lang="en-US" dirty="0"/>
           </a:p>
@@ -1571,10 +2097,9 @@
           <a:bodyPr/>
           <a:lstStyle/>
           <a:p>
-            <a:fld id="{FBF54567-0DE4-3F47-BF90-CB84690072F9}" type="datetimeFigureOut">
-              <a:rPr lang="en-US" dirty="0"/>
-              <a:pPr/>
-              <a:t>12/8/2015</a:t>
+            <a:fld id="{76EC9034-8D3C-49F5-BB68-A73BB053F93B}" type="datetime1">
+              <a:rPr lang="en-US" smtClean="0"/>
+              <a:t>12/9/2015</a:t>
             </a:fld>
             <a:endParaRPr lang="en-US" dirty="0"/>
           </a:p>
@@ -1725,7 +2250,7 @@
           <a:ln/>
           <a:extLst>
             <a:ext uri="{91240B29-F687-4f45-9708-019B960494DF}">
-              <a14:hiddenLine xmlns:a14="http://schemas.microsoft.com/office/drawing/2010/main" xmlns="" w="9525">
+              <a14:hiddenLine xmlns="" xmlns:a14="http://schemas.microsoft.com/office/drawing/2010/main" w="9525">
                 <a:solidFill>
                   <a:srgbClr val="000000"/>
                 </a:solidFill>
@@ -1841,10 +2366,9 @@
           <a:bodyPr/>
           <a:lstStyle/>
           <a:p>
-            <a:fld id="{C6C52C72-DE31-F449-A4ED-4C594FD91407}" type="datetimeFigureOut">
-              <a:rPr lang="en-US" dirty="0"/>
-              <a:pPr/>
-              <a:t>12/8/2015</a:t>
+            <a:fld id="{FF5D1241-E1FA-4045-B6B5-CE3B60397148}" type="datetime1">
+              <a:rPr lang="en-US" smtClean="0"/>
+              <a:t>12/9/2015</a:t>
             </a:fld>
             <a:endParaRPr lang="en-US" dirty="0"/>
           </a:p>
@@ -1997,7 +2521,7 @@
           <a:ln/>
           <a:extLst>
             <a:ext uri="{91240B29-F687-4f45-9708-019B960494DF}">
-              <a14:hiddenLine xmlns:a14="http://schemas.microsoft.com/office/drawing/2010/main" xmlns="" w="9525">
+              <a14:hiddenLine xmlns="" xmlns:a14="http://schemas.microsoft.com/office/drawing/2010/main" w="9525">
                 <a:solidFill>
                   <a:srgbClr val="000000"/>
                 </a:solidFill>
@@ -2123,10 +2647,9 @@
           <a:bodyPr/>
           <a:lstStyle/>
           <a:p>
-            <a:fld id="{ED62726E-379B-B349-9EED-81ED093FA806}" type="datetimeFigureOut">
-              <a:rPr lang="en-US" dirty="0"/>
-              <a:pPr/>
-              <a:t>12/8/2015</a:t>
+            <a:fld id="{1833F9B2-22E5-4FD1-9BDF-F4EE223A1AE3}" type="datetime1">
+              <a:rPr lang="en-US" smtClean="0"/>
+              <a:t>12/9/2015</a:t>
             </a:fld>
             <a:endParaRPr lang="en-US" dirty="0"/>
           </a:p>
@@ -2277,7 +2800,7 @@
           <a:ln/>
           <a:extLst>
             <a:ext uri="{91240B29-F687-4f45-9708-019B960494DF}">
-              <a14:hiddenLine xmlns:a14="http://schemas.microsoft.com/office/drawing/2010/main" xmlns="" w="9525">
+              <a14:hiddenLine xmlns="" xmlns:a14="http://schemas.microsoft.com/office/drawing/2010/main" w="9525">
                 <a:solidFill>
                   <a:srgbClr val="000000"/>
                 </a:solidFill>
@@ -2403,10 +2926,9 @@
           <a:bodyPr/>
           <a:lstStyle/>
           <a:p>
-            <a:fld id="{9B3A1323-8D79-1946-B0D7-40001CF92E9D}" type="datetimeFigureOut">
-              <a:rPr lang="en-US" dirty="0"/>
-              <a:pPr/>
-              <a:t>12/8/2015</a:t>
+            <a:fld id="{A0663C9B-BB84-4C22-A591-5CF65411CE61}" type="datetime1">
+              <a:rPr lang="en-US" smtClean="0"/>
+              <a:t>12/9/2015</a:t>
             </a:fld>
             <a:endParaRPr lang="en-US" dirty="0"/>
           </a:p>
@@ -2743,10 +3265,9 @@
           <a:bodyPr/>
           <a:lstStyle/>
           <a:p>
-            <a:fld id="{8DFA1846-DA80-1C48-A609-854EA85C59AD}" type="datetimeFigureOut">
-              <a:rPr lang="en-US" dirty="0"/>
-              <a:pPr/>
-              <a:t>12/8/2015</a:t>
+            <a:fld id="{4A61105C-D42F-442A-BAED-002F175CFA8D}" type="datetime1">
+              <a:rPr lang="en-US" smtClean="0"/>
+              <a:t>12/9/2015</a:t>
             </a:fld>
             <a:endParaRPr lang="en-US" dirty="0"/>
           </a:p>
@@ -2897,7 +3418,7 @@
           <a:ln/>
           <a:extLst>
             <a:ext uri="{91240B29-F687-4f45-9708-019B960494DF}">
-              <a14:hiddenLine xmlns:a14="http://schemas.microsoft.com/office/drawing/2010/main" xmlns="" w="9525">
+              <a14:hiddenLine xmlns="" xmlns:a14="http://schemas.microsoft.com/office/drawing/2010/main" w="9525">
                 <a:solidFill>
                   <a:srgbClr val="000000"/>
                 </a:solidFill>
@@ -3079,10 +3600,9 @@
           <a:bodyPr/>
           <a:lstStyle/>
           <a:p>
-            <a:fld id="{57302355-E14B-8545-A8F8-0FE83CC9D524}" type="datetimeFigureOut">
-              <a:rPr lang="en-US" dirty="0"/>
-              <a:pPr/>
-              <a:t>12/8/2015</a:t>
+            <a:fld id="{83201343-60FE-47A0-AB0B-1B379C1AC1D2}" type="datetime1">
+              <a:rPr lang="en-US" smtClean="0"/>
+              <a:t>12/9/2015</a:t>
             </a:fld>
             <a:endParaRPr lang="en-US" dirty="0"/>
           </a:p>
@@ -3233,7 +3753,7 @@
           <a:ln/>
           <a:extLst>
             <a:ext uri="{91240B29-F687-4f45-9708-019B960494DF}">
-              <a14:hiddenLine xmlns:a14="http://schemas.microsoft.com/office/drawing/2010/main" xmlns="" w="9525">
+              <a14:hiddenLine xmlns="" xmlns:a14="http://schemas.microsoft.com/office/drawing/2010/main" w="9525">
                 <a:solidFill>
                   <a:srgbClr val="000000"/>
                 </a:solidFill>
@@ -3553,10 +4073,9 @@
           <a:bodyPr/>
           <a:lstStyle/>
           <a:p>
-            <a:fld id="{02640F58-564D-2B4F-AE67-E407BA4FCF45}" type="datetimeFigureOut">
-              <a:rPr lang="en-US" dirty="0"/>
-              <a:pPr/>
-              <a:t>12/8/2015</a:t>
+            <a:fld id="{7502B4AC-1DC0-46E8-9DFD-0AC21280E030}" type="datetime1">
+              <a:rPr lang="en-US" smtClean="0"/>
+              <a:t>12/9/2015</a:t>
             </a:fld>
             <a:endParaRPr lang="en-US" dirty="0"/>
           </a:p>
@@ -3707,7 +4226,7 @@
           <a:ln/>
           <a:extLst>
             <a:ext uri="{91240B29-F687-4f45-9708-019B960494DF}">
-              <a14:hiddenLine xmlns:a14="http://schemas.microsoft.com/office/drawing/2010/main" xmlns="" w="9525">
+              <a14:hiddenLine xmlns="" xmlns:a14="http://schemas.microsoft.com/office/drawing/2010/main" w="9525">
                 <a:solidFill>
                   <a:srgbClr val="000000"/>
                 </a:solidFill>
@@ -3771,10 +4290,9 @@
           <a:bodyPr/>
           <a:lstStyle/>
           <a:p>
-            <a:fld id="{F13A34C8-038E-2045-AF43-DF7DBB8E0E9E}" type="datetimeFigureOut">
-              <a:rPr lang="en-US" dirty="0"/>
-              <a:pPr/>
-              <a:t>12/8/2015</a:t>
+            <a:fld id="{9C3BDF22-8170-467C-9CA9-05D5E9C6C2A3}" type="datetime1">
+              <a:rPr lang="en-US" smtClean="0"/>
+              <a:t>12/9/2015</a:t>
             </a:fld>
             <a:endParaRPr lang="en-US" dirty="0"/>
           </a:p>
@@ -3863,10 +4381,9 @@
           <a:bodyPr/>
           <a:lstStyle/>
           <a:p>
-            <a:fld id="{8818C68F-D26B-8F47-958C-23B49CF8A634}" type="datetimeFigureOut">
-              <a:rPr lang="en-US" dirty="0"/>
-              <a:pPr/>
-              <a:t>12/8/2015</a:t>
+            <a:fld id="{5813E341-95B1-4E25-B7F5-5FBE521046B6}" type="datetime1">
+              <a:rPr lang="en-US" smtClean="0"/>
+              <a:t>12/9/2015</a:t>
             </a:fld>
             <a:endParaRPr lang="en-US" dirty="0"/>
           </a:p>
@@ -4130,7 +4647,7 @@
           <a:ln/>
           <a:extLst>
             <a:ext uri="{91240B29-F687-4f45-9708-019B960494DF}">
-              <a14:hiddenLine xmlns:a14="http://schemas.microsoft.com/office/drawing/2010/main" xmlns="" w="9525">
+              <a14:hiddenLine xmlns="" xmlns:a14="http://schemas.microsoft.com/office/drawing/2010/main" w="9525">
                 <a:solidFill>
                   <a:srgbClr val="000000"/>
                 </a:solidFill>
@@ -4327,10 +4844,9 @@
           <a:bodyPr/>
           <a:lstStyle/>
           <a:p>
-            <a:fld id="{D0DF5E60-9974-AC48-9591-99C2BB44B7CF}" type="datetimeFigureOut">
-              <a:rPr lang="en-US" dirty="0"/>
-              <a:pPr/>
-              <a:t>12/8/2015</a:t>
+            <a:fld id="{709D7943-9D69-49C6-BB7B-454D4A17FF6B}" type="datetime1">
+              <a:rPr lang="en-US" smtClean="0"/>
+              <a:t>12/9/2015</a:t>
             </a:fld>
             <a:endParaRPr lang="en-US" dirty="0"/>
           </a:p>
@@ -4637,10 +5153,9 @@
           <a:bodyPr/>
           <a:lstStyle/>
           <a:p>
-            <a:fld id="{18C79C5D-2A6F-F04D-97DA-BEF2467B64E4}" type="datetimeFigureOut">
-              <a:rPr lang="en-US" dirty="0"/>
-              <a:pPr/>
-              <a:t>12/8/2015</a:t>
+            <a:fld id="{1A647AD8-72D8-4B1C-9F4E-7CEE2DC60198}" type="datetime1">
+              <a:rPr lang="en-US" smtClean="0"/>
+              <a:t>12/9/2015</a:t>
             </a:fld>
             <a:endParaRPr lang="en-US" dirty="0"/>
           </a:p>
@@ -4904,10 +5419,9 @@
             </a:lvl1pPr>
           </a:lstStyle>
           <a:p>
-            <a:fld id="{09B482E8-6E0E-1B4F-B1FD-C69DB9E858D9}" type="datetimeFigureOut">
-              <a:rPr lang="en-US" dirty="0"/>
-              <a:pPr/>
-              <a:t>12/8/2015</a:t>
+            <a:fld id="{1957CA93-94D9-4C86-A901-ABB6095C14C7}" type="datetime1">
+              <a:rPr lang="en-US" smtClean="0"/>
+              <a:t>12/9/2015</a:t>
             </a:fld>
             <a:endParaRPr lang="en-US" dirty="0"/>
           </a:p>
@@ -4972,7 +5486,7 @@
     <p:sldLayoutId id="2147483658" r:id="rId13"/>
     <p:sldLayoutId id="2147483659" r:id="rId14"/>
   </p:sldLayoutIdLst>
-  <p:hf sldNum="0" hdr="0" ftr="0" dt="0"/>
+  <p:hf hdr="0" ftr="0" dt="0"/>
   <p:txStyles>
     <p:titleStyle>
       <a:lvl1pPr algn="l" defTabSz="457200" rtl="0" eaLnBrk="1" latinLnBrk="0" hangingPunct="1">
@@ -5413,9 +5927,37 @@
           <a:p>
             <a:r>
               <a:rPr lang="fr-FR" dirty="0" smtClean="0"/>
-              <a:t>Jean-Frédéric Durand, M1, université Lille 1</a:t>
+              <a:t>JF </a:t>
+            </a:r>
+            <a:r>
+              <a:rPr lang="fr-FR" dirty="0" smtClean="0"/>
+              <a:t>Durand, M1, université Lille 1</a:t>
             </a:r>
             <a:endParaRPr lang="fr-FR" dirty="0"/>
+          </a:p>
+        </p:txBody>
+      </p:sp>
+      <p:sp>
+        <p:nvSpPr>
+          <p:cNvPr id="4" name="Espace réservé du numéro de diapositive 3"/>
+          <p:cNvSpPr>
+            <a:spLocks noGrp="1"/>
+          </p:cNvSpPr>
+          <p:nvPr>
+            <p:ph type="sldNum" sz="quarter" idx="12"/>
+          </p:nvPr>
+        </p:nvSpPr>
+        <p:spPr/>
+        <p:txBody>
+          <a:bodyPr/>
+          <a:lstStyle/>
+          <a:p>
+            <a:fld id="{D57F1E4F-1CFF-5643-939E-217C01CDF565}" type="slidenum">
+              <a:rPr lang="en-US" smtClean="0"/>
+              <a:pPr/>
+              <a:t>1</a:t>
+            </a:fld>
+            <a:endParaRPr lang="en-US" dirty="0"/>
           </a:p>
         </p:txBody>
       </p:sp>
@@ -5703,6 +6245,30 @@
           </a:extLst>
         </p:spPr>
       </p:pic>
+      <p:sp>
+        <p:nvSpPr>
+          <p:cNvPr id="5" name="Espace réservé du numéro de diapositive 4"/>
+          <p:cNvSpPr>
+            <a:spLocks noGrp="1"/>
+          </p:cNvSpPr>
+          <p:nvPr>
+            <p:ph type="sldNum" sz="quarter" idx="12"/>
+          </p:nvPr>
+        </p:nvSpPr>
+        <p:spPr/>
+        <p:txBody>
+          <a:bodyPr/>
+          <a:lstStyle/>
+          <a:p>
+            <a:fld id="{D57F1E4F-1CFF-5643-939E-217C01CDF565}" type="slidenum">
+              <a:rPr lang="en-US" smtClean="0"/>
+              <a:pPr/>
+              <a:t>10</a:t>
+            </a:fld>
+            <a:endParaRPr lang="en-US" dirty="0"/>
+          </a:p>
+        </p:txBody>
+      </p:sp>
     </p:spTree>
     <p:extLst>
       <p:ext uri="{BB962C8B-B14F-4D97-AF65-F5344CB8AC3E}">
@@ -5713,6 +6279,13 @@
   <p:clrMapOvr>
     <a:masterClrMapping/>
   </p:clrMapOvr>
+  <p:timing>
+    <p:tnLst>
+      <p:par>
+        <p:cTn id="1" dur="indefinite" restart="never" nodeType="tmRoot"/>
+      </p:par>
+    </p:tnLst>
+  </p:timing>
 </p:sld>
 </file>
 
@@ -5750,7 +6323,7 @@
           <a:p>
             <a:r>
               <a:rPr lang="fr-FR" dirty="0" smtClean="0"/>
-              <a:t>Conclusion</a:t>
+              <a:t>Groups</a:t>
             </a:r>
             <a:endParaRPr lang="fr-FR" dirty="0"/>
           </a:p>
@@ -5766,36 +6339,201 @@
             <p:ph idx="1"/>
           </p:nvPr>
         </p:nvSpPr>
+        <p:spPr>
+          <a:xfrm>
+            <a:off x="818712" y="2222287"/>
+            <a:ext cx="10554574" cy="494787"/>
+          </a:xfrm>
+        </p:spPr>
+        <p:txBody>
+          <a:bodyPr/>
+          <a:lstStyle/>
+          <a:p>
+            <a:r>
+              <a:rPr lang="fr-FR" dirty="0" smtClean="0"/>
+              <a:t>In practice</a:t>
+            </a:r>
+            <a:endParaRPr lang="fr-FR" dirty="0"/>
+          </a:p>
+        </p:txBody>
+      </p:sp>
+      <p:sp>
+        <p:nvSpPr>
+          <p:cNvPr id="4" name="Espace réservé du numéro de diapositive 3"/>
+          <p:cNvSpPr>
+            <a:spLocks noGrp="1"/>
+          </p:cNvSpPr>
+          <p:nvPr>
+            <p:ph type="sldNum" sz="quarter" idx="12"/>
+          </p:nvPr>
+        </p:nvSpPr>
         <p:spPr/>
         <p:txBody>
           <a:bodyPr/>
           <a:lstStyle/>
           <a:p>
-            <a:r>
-              <a:rPr lang="fr-FR" dirty="0" err="1" smtClean="0"/>
-              <a:t>Mathematics</a:t>
-            </a:r>
-            <a:r>
-              <a:rPr lang="fr-FR" dirty="0" smtClean="0"/>
-              <a:t> are </a:t>
-            </a:r>
-            <a:r>
-              <a:rPr lang="fr-FR" dirty="0" err="1" smtClean="0"/>
-              <a:t>universal</a:t>
-            </a:r>
-            <a:r>
-              <a:rPr lang="fr-FR" dirty="0" smtClean="0"/>
-              <a:t> ?</a:t>
-            </a:r>
-          </a:p>
-          <a:p>
-            <a:r>
-              <a:rPr lang="fr-FR" dirty="0" smtClean="0"/>
-              <a:t>« </a:t>
-            </a:r>
-            <a:r>
-              <a:rPr lang="fr-FR" dirty="0" err="1" smtClean="0"/>
-              <a:t>Mathematics</a:t>
+            <a:fld id="{D57F1E4F-1CFF-5643-939E-217C01CDF565}" type="slidenum">
+              <a:rPr lang="en-US" smtClean="0"/>
+              <a:pPr/>
+              <a:t>11</a:t>
+            </a:fld>
+            <a:endParaRPr lang="en-US" dirty="0"/>
+          </a:p>
+        </p:txBody>
+      </p:sp>
+      <p:pic>
+        <p:nvPicPr>
+          <p:cNvPr id="1026" name="Picture 2" descr="http://appliweb.exponum.com/uploads/groups/les-pavages-201503121135/les-pavages-pierre-touplain/image/55f5551570d819ed4bdcb669f5d73e0568e4b945.gif"/>
+          <p:cNvPicPr>
+            <a:picLocks noChangeAspect="1" noChangeArrowheads="1"/>
+          </p:cNvPicPr>
+          <p:nvPr/>
+        </p:nvPicPr>
+        <p:blipFill>
+          <a:blip r:embed="rId2">
+            <a:extLst>
+              <a:ext uri="{28A0092B-C50C-407E-A947-70E740481C1C}">
+                <a14:useLocalDpi xmlns:a14="http://schemas.microsoft.com/office/drawing/2010/main" val="0"/>
+              </a:ext>
+            </a:extLst>
+          </a:blip>
+          <a:srcRect/>
+          <a:stretch>
+            <a:fillRect/>
+          </a:stretch>
+        </p:blipFill>
+        <p:spPr bwMode="auto">
+          <a:xfrm>
+            <a:off x="810000" y="2834612"/>
+            <a:ext cx="3150794" cy="2625662"/>
+          </a:xfrm>
+          <a:prstGeom prst="rect">
+            <a:avLst/>
+          </a:prstGeom>
+          <a:noFill/>
+          <a:extLst>
+            <a:ext uri="{909E8E84-426E-40DD-AFC4-6F175D3DCCD1}">
+              <a14:hiddenFill xmlns:a14="http://schemas.microsoft.com/office/drawing/2010/main">
+                <a:solidFill>
+                  <a:srgbClr val="FFFFFF"/>
+                </a:solidFill>
+              </a14:hiddenFill>
+            </a:ext>
+          </a:extLst>
+        </p:spPr>
+      </p:pic>
+      <p:pic>
+        <p:nvPicPr>
+          <p:cNvPr id="1028" name="Picture 4" descr="Ammonia-3D-balls-A.png"/>
+          <p:cNvPicPr>
+            <a:picLocks noChangeAspect="1" noChangeArrowheads="1"/>
+          </p:cNvPicPr>
+          <p:nvPr/>
+        </p:nvPicPr>
+        <p:blipFill>
+          <a:blip r:embed="rId3">
+            <a:extLst>
+              <a:ext uri="{28A0092B-C50C-407E-A947-70E740481C1C}">
+                <a14:useLocalDpi xmlns:a14="http://schemas.microsoft.com/office/drawing/2010/main" val="0"/>
+              </a:ext>
+            </a:extLst>
+          </a:blip>
+          <a:srcRect/>
+          <a:stretch>
+            <a:fillRect/>
+          </a:stretch>
+        </p:blipFill>
+        <p:spPr bwMode="auto">
+          <a:xfrm>
+            <a:off x="6023977" y="2834612"/>
+            <a:ext cx="1190625" cy="914401"/>
+          </a:xfrm>
+          <a:prstGeom prst="rect">
+            <a:avLst/>
+          </a:prstGeom>
+          <a:noFill/>
+          <a:extLst>
+            <a:ext uri="{909E8E84-426E-40DD-AFC4-6F175D3DCCD1}">
+              <a14:hiddenFill xmlns:a14="http://schemas.microsoft.com/office/drawing/2010/main">
+                <a:solidFill>
+                  <a:srgbClr val="FFFFFF"/>
+                </a:solidFill>
+              </a14:hiddenFill>
+            </a:ext>
+          </a:extLst>
+        </p:spPr>
+      </p:pic>
+      <p:pic>
+        <p:nvPicPr>
+          <p:cNvPr id="1030" name="Picture 6" descr="https://upload.wikimedia.org/wikipedia/commons/thumb/d/de/Circle_as_Lie_group2.svg/220px-Circle_as_Lie_group2.svg.png"/>
+          <p:cNvPicPr>
+            <a:picLocks noChangeAspect="1" noChangeArrowheads="1"/>
+          </p:cNvPicPr>
+          <p:nvPr/>
+        </p:nvPicPr>
+        <p:blipFill>
+          <a:blip r:embed="rId4">
+            <a:extLst>
+              <a:ext uri="{28A0092B-C50C-407E-A947-70E740481C1C}">
+                <a14:useLocalDpi xmlns:a14="http://schemas.microsoft.com/office/drawing/2010/main" val="0"/>
+              </a:ext>
+            </a:extLst>
+          </a:blip>
+          <a:srcRect/>
+          <a:stretch>
+            <a:fillRect/>
+          </a:stretch>
+        </p:blipFill>
+        <p:spPr bwMode="auto">
+          <a:xfrm>
+            <a:off x="9277783" y="2812004"/>
+            <a:ext cx="2095500" cy="2305050"/>
+          </a:xfrm>
+          <a:prstGeom prst="rect">
+            <a:avLst/>
+          </a:prstGeom>
+          <a:noFill/>
+          <a:extLst>
+            <a:ext uri="{909E8E84-426E-40DD-AFC4-6F175D3DCCD1}">
+              <a14:hiddenFill xmlns:a14="http://schemas.microsoft.com/office/drawing/2010/main">
+                <a:solidFill>
+                  <a:srgbClr val="FFFFFF"/>
+                </a:solidFill>
+              </a14:hiddenFill>
+            </a:ext>
+          </a:extLst>
+        </p:spPr>
+      </p:pic>
+      <p:sp>
+        <p:nvSpPr>
+          <p:cNvPr id="5" name="ZoneTexte 4"/>
+          <p:cNvSpPr txBox="1"/>
+          <p:nvPr/>
+        </p:nvSpPr>
+        <p:spPr>
+          <a:xfrm>
+            <a:off x="810000" y="5682343"/>
+            <a:ext cx="3150794" cy="646331"/>
+          </a:xfrm>
+          <a:prstGeom prst="rect">
+            <a:avLst/>
+          </a:prstGeom>
+          <a:noFill/>
+        </p:spPr>
+        <p:txBody>
+          <a:bodyPr wrap="square" rtlCol="0">
+            <a:spAutoFit/>
+          </a:bodyPr>
+          <a:lstStyle/>
+          <a:p>
+            <a:pPr algn="ctr"/>
+            <a:r>
+              <a:rPr lang="fr-FR" dirty="0" smtClean="0"/>
+              <a:t>17 </a:t>
+            </a:r>
+            <a:r>
+              <a:rPr lang="fr-FR" dirty="0" err="1" smtClean="0"/>
+              <a:t>regular</a:t>
             </a:r>
             <a:r>
               <a:rPr lang="fr-FR" dirty="0" smtClean="0"/>
@@ -5803,7 +6541,7 @@
             </a:r>
             <a:r>
               <a:rPr lang="fr-FR" dirty="0" err="1" smtClean="0"/>
-              <a:t>should</a:t>
+              <a:t>paving</a:t>
             </a:r>
             <a:r>
               <a:rPr lang="fr-FR" dirty="0" smtClean="0"/>
@@ -5811,7 +6549,117 @@
             </a:r>
             <a:r>
               <a:rPr lang="fr-FR" dirty="0" err="1" smtClean="0"/>
-              <a:t>be</a:t>
+              <a:t>like</a:t>
+            </a:r>
+            <a:r>
+              <a:rPr lang="fr-FR" dirty="0" smtClean="0"/>
+              <a:t> </a:t>
+            </a:r>
+            <a:r>
+              <a:rPr lang="fr-FR" dirty="0" err="1" smtClean="0"/>
+              <a:t>this</a:t>
+            </a:r>
+            <a:r>
+              <a:rPr lang="fr-FR" dirty="0" smtClean="0"/>
+              <a:t> one in the plane</a:t>
+            </a:r>
+            <a:endParaRPr lang="fr-FR" dirty="0"/>
+          </a:p>
+        </p:txBody>
+      </p:sp>
+      <p:sp>
+        <p:nvSpPr>
+          <p:cNvPr id="6" name="ZoneTexte 5"/>
+          <p:cNvSpPr txBox="1"/>
+          <p:nvPr/>
+        </p:nvSpPr>
+        <p:spPr>
+          <a:xfrm>
+            <a:off x="4679454" y="3866551"/>
+            <a:ext cx="3879669" cy="369332"/>
+          </a:xfrm>
+          <a:prstGeom prst="rect">
+            <a:avLst/>
+          </a:prstGeom>
+          <a:noFill/>
+        </p:spPr>
+        <p:txBody>
+          <a:bodyPr wrap="square" rtlCol="0">
+            <a:spAutoFit/>
+          </a:bodyPr>
+          <a:lstStyle/>
+          <a:p>
+            <a:pPr algn="ctr"/>
+            <a:r>
+              <a:rPr lang="fr-FR" dirty="0" err="1" smtClean="0"/>
+              <a:t>Ammonia</a:t>
+            </a:r>
+            <a:r>
+              <a:rPr lang="fr-FR" dirty="0" smtClean="0"/>
+              <a:t>, group of </a:t>
+            </a:r>
+            <a:r>
+              <a:rPr lang="fr-FR" dirty="0" err="1" smtClean="0"/>
+              <a:t>order</a:t>
+            </a:r>
+            <a:r>
+              <a:rPr lang="fr-FR" dirty="0" smtClean="0"/>
+              <a:t> 6</a:t>
+            </a:r>
+            <a:endParaRPr lang="fr-FR" dirty="0"/>
+          </a:p>
+        </p:txBody>
+      </p:sp>
+      <p:sp>
+        <p:nvSpPr>
+          <p:cNvPr id="7" name="ZoneTexte 6"/>
+          <p:cNvSpPr txBox="1"/>
+          <p:nvPr/>
+        </p:nvSpPr>
+        <p:spPr>
+          <a:xfrm>
+            <a:off x="9277783" y="5315723"/>
+            <a:ext cx="2104215" cy="1200329"/>
+          </a:xfrm>
+          <a:prstGeom prst="rect">
+            <a:avLst/>
+          </a:prstGeom>
+          <a:noFill/>
+        </p:spPr>
+        <p:txBody>
+          <a:bodyPr wrap="square" rtlCol="0">
+            <a:spAutoFit/>
+          </a:bodyPr>
+          <a:lstStyle/>
+          <a:p>
+            <a:pPr algn="ctr"/>
+            <a:r>
+              <a:rPr lang="fr-FR" dirty="0" err="1" smtClean="0"/>
+              <a:t>Trigonometric</a:t>
+            </a:r>
+            <a:r>
+              <a:rPr lang="fr-FR" dirty="0" smtClean="0"/>
+              <a:t> </a:t>
+            </a:r>
+            <a:r>
+              <a:rPr lang="fr-FR" dirty="0" err="1" smtClean="0"/>
+              <a:t>circle</a:t>
+            </a:r>
+            <a:r>
+              <a:rPr lang="fr-FR" dirty="0" smtClean="0"/>
+              <a:t> </a:t>
+            </a:r>
+            <a:r>
+              <a:rPr lang="fr-FR" dirty="0" err="1" smtClean="0"/>
+              <a:t>with</a:t>
+            </a:r>
+            <a:r>
+              <a:rPr lang="fr-FR" dirty="0" smtClean="0"/>
+              <a:t> multiplication </a:t>
+            </a:r>
+            <a:r>
+              <a:rPr lang="fr-FR" dirty="0" err="1" smtClean="0"/>
+              <a:t>is</a:t>
             </a:r>
             <a:r>
               <a:rPr lang="fr-FR" dirty="0" smtClean="0"/>
@@ -5819,123 +6667,11 @@
             </a:r>
             <a:r>
               <a:rPr lang="fr-FR" dirty="0" err="1" smtClean="0"/>
-              <a:t>obviousness</a:t>
-            </a:r>
-            <a:r>
-              <a:rPr lang="fr-FR" dirty="0" smtClean="0"/>
-              <a:t> for </a:t>
-            </a:r>
-            <a:r>
-              <a:rPr lang="fr-FR" dirty="0" err="1" smtClean="0"/>
-              <a:t>everyone</a:t>
-            </a:r>
-            <a:r>
-              <a:rPr lang="fr-FR" dirty="0" smtClean="0"/>
-              <a:t>, </a:t>
-            </a:r>
-            <a:r>
-              <a:rPr lang="fr-FR" dirty="0" err="1" smtClean="0"/>
-              <a:t>because</a:t>
-            </a:r>
-            <a:r>
-              <a:rPr lang="fr-FR" dirty="0" smtClean="0"/>
-              <a:t> </a:t>
-            </a:r>
-            <a:r>
-              <a:rPr lang="fr-FR" dirty="0" err="1" smtClean="0"/>
-              <a:t>it’s</a:t>
-            </a:r>
-            <a:r>
-              <a:rPr lang="fr-FR" dirty="0" smtClean="0"/>
-              <a:t> </a:t>
-            </a:r>
-            <a:r>
-              <a:rPr lang="fr-FR" dirty="0" err="1" smtClean="0"/>
-              <a:t>only</a:t>
-            </a:r>
-            <a:r>
-              <a:rPr lang="fr-FR" dirty="0" smtClean="0"/>
-              <a:t> a </a:t>
-            </a:r>
-            <a:r>
-              <a:rPr lang="fr-FR" dirty="0" err="1" smtClean="0"/>
-              <a:t>logical</a:t>
-            </a:r>
-            <a:r>
-              <a:rPr lang="fr-FR" dirty="0" smtClean="0"/>
-              <a:t> </a:t>
-            </a:r>
-            <a:r>
-              <a:rPr lang="fr-FR" dirty="0" err="1" smtClean="0"/>
-              <a:t>concatenation</a:t>
-            </a:r>
-            <a:r>
-              <a:rPr lang="fr-FR" dirty="0" smtClean="0"/>
-              <a:t>, </a:t>
-            </a:r>
-            <a:r>
-              <a:rPr lang="fr-FR" dirty="0" err="1" smtClean="0"/>
-              <a:t>which</a:t>
-            </a:r>
-            <a:r>
-              <a:rPr lang="fr-FR" dirty="0" smtClean="0"/>
-              <a:t> </a:t>
-            </a:r>
-            <a:r>
-              <a:rPr lang="fr-FR" dirty="0" err="1" smtClean="0"/>
-              <a:t>is</a:t>
-            </a:r>
-            <a:r>
-              <a:rPr lang="fr-FR" dirty="0" smtClean="0"/>
-              <a:t> in </a:t>
-            </a:r>
-            <a:r>
-              <a:rPr lang="fr-FR" dirty="0" err="1" smtClean="0"/>
-              <a:t>theroy</a:t>
-            </a:r>
-            <a:r>
-              <a:rPr lang="fr-FR" dirty="0" smtClean="0"/>
-              <a:t> a </a:t>
-            </a:r>
-            <a:r>
-              <a:rPr lang="fr-FR" dirty="0" err="1" smtClean="0"/>
-              <a:t>formality</a:t>
-            </a:r>
-            <a:r>
-              <a:rPr lang="fr-FR" dirty="0" smtClean="0"/>
-              <a:t> of the ‘</a:t>
-            </a:r>
-            <a:r>
-              <a:rPr lang="fr-FR" dirty="0" err="1" smtClean="0"/>
-              <a:t>common</a:t>
-            </a:r>
-            <a:r>
-              <a:rPr lang="fr-FR" dirty="0" smtClean="0"/>
-              <a:t> </a:t>
-            </a:r>
-            <a:r>
-              <a:rPr lang="fr-FR" dirty="0" err="1" smtClean="0"/>
-              <a:t>sense</a:t>
-            </a:r>
-            <a:r>
-              <a:rPr lang="fr-FR" dirty="0" smtClean="0"/>
-              <a:t>’ </a:t>
-            </a:r>
-            <a:r>
-              <a:rPr lang="fr-FR" dirty="0" err="1" smtClean="0"/>
-              <a:t>shared</a:t>
-            </a:r>
-            <a:r>
-              <a:rPr lang="fr-FR" dirty="0" smtClean="0"/>
-              <a:t> by </a:t>
-            </a:r>
-            <a:r>
-              <a:rPr lang="fr-FR" dirty="0" err="1" smtClean="0"/>
-              <a:t>everybody</a:t>
-            </a:r>
-            <a:r>
-              <a:rPr lang="fr-FR" dirty="0" smtClean="0"/>
-              <a:t> » Poincaré</a:t>
+              <a:t>usual</a:t>
+            </a:r>
+            <a:r>
+              <a:rPr lang="fr-FR" dirty="0" smtClean="0"/>
+              <a:t> group</a:t>
             </a:r>
             <a:endParaRPr lang="fr-FR" dirty="0"/>
           </a:p>
@@ -5944,13 +6680,20 @@
     </p:spTree>
     <p:extLst>
       <p:ext uri="{BB962C8B-B14F-4D97-AF65-F5344CB8AC3E}">
-        <p14:creationId xmlns:p14="http://schemas.microsoft.com/office/powerpoint/2010/main" val="2213883594"/>
+        <p14:creationId xmlns:p14="http://schemas.microsoft.com/office/powerpoint/2010/main" val="3834976514"/>
       </p:ext>
     </p:extLst>
   </p:cSld>
   <p:clrMapOvr>
     <a:masterClrMapping/>
   </p:clrMapOvr>
+  <p:timing>
+    <p:tnLst>
+      <p:par>
+        <p:cTn id="1" dur="indefinite" restart="never" nodeType="tmRoot"/>
+      </p:par>
+    </p:tnLst>
+  </p:timing>
 </p:sld>
 </file>
 
@@ -5987,8 +6730,8 @@
           <a:lstStyle/>
           <a:p>
             <a:r>
-              <a:rPr lang="fr-FR" dirty="0" err="1" smtClean="0"/>
-              <a:t>Bibliography</a:t>
+              <a:rPr lang="fr-FR" dirty="0" smtClean="0"/>
+              <a:t>Conclusion</a:t>
             </a:r>
             <a:endParaRPr lang="fr-FR" dirty="0"/>
           </a:p>
@@ -6010,105 +6753,203 @@
           <a:lstStyle/>
           <a:p>
             <a:r>
-              <a:rPr lang="fr-FR" dirty="0" smtClean="0"/>
-              <a:t>Podcast Science</a:t>
-            </a:r>
-          </a:p>
-          <a:p>
-            <a:r>
-              <a:rPr lang="fr-FR" dirty="0"/>
-              <a:t>R. </a:t>
-            </a:r>
-            <a:r>
-              <a:rPr lang="fr-FR" dirty="0" err="1"/>
-              <a:t>Herz</a:t>
-            </a:r>
-            <a:r>
-              <a:rPr lang="fr-FR" dirty="0"/>
-              <a:t>-Fischler, A </a:t>
-            </a:r>
-            <a:r>
-              <a:rPr lang="fr-FR" dirty="0" err="1"/>
-              <a:t>Mathematical</a:t>
-            </a:r>
-            <a:r>
-              <a:rPr lang="fr-FR" dirty="0"/>
+              <a:rPr lang="fr-FR" dirty="0" err="1" smtClean="0"/>
+              <a:t>Mathematics</a:t>
+            </a:r>
+            <a:r>
+              <a:rPr lang="fr-FR" dirty="0" smtClean="0"/>
+              <a:t> are </a:t>
+            </a:r>
+            <a:r>
+              <a:rPr lang="fr-FR" dirty="0" err="1" smtClean="0"/>
+              <a:t>universal</a:t>
+            </a:r>
+            <a:r>
+              <a:rPr lang="fr-FR" dirty="0" smtClean="0"/>
+              <a:t> ?</a:t>
+            </a:r>
+          </a:p>
+          <a:p>
+            <a:r>
+              <a:rPr lang="fr-FR" dirty="0" smtClean="0"/>
+              <a:t>« </a:t>
+            </a:r>
+            <a:r>
+              <a:rPr lang="fr-FR" dirty="0" err="1" smtClean="0"/>
+              <a:t>Mathematics</a:t>
+            </a:r>
+            <a:r>
+              <a:rPr lang="fr-FR" dirty="0" smtClean="0"/>
               <a:t> </a:t>
             </a:r>
             <a:r>
-              <a:rPr lang="fr-FR" dirty="0" err="1"/>
-              <a:t>History</a:t>
-            </a:r>
-            <a:r>
-              <a:rPr lang="fr-FR" dirty="0"/>
-              <a:t> of Division in </a:t>
-            </a:r>
-            <a:r>
-              <a:rPr lang="fr-FR" dirty="0" err="1"/>
-              <a:t>Extreme</a:t>
-            </a:r>
-            <a:r>
-              <a:rPr lang="fr-FR" dirty="0"/>
-              <a:t> and </a:t>
-            </a:r>
-            <a:r>
-              <a:rPr lang="fr-FR" dirty="0" err="1"/>
-              <a:t>Mean</a:t>
-            </a:r>
-            <a:r>
-              <a:rPr lang="fr-FR" dirty="0"/>
-              <a:t> Ratio, Wilfrid Laurier</a:t>
-            </a:r>
-            <a:r>
-              <a:rPr lang="fr-FR" dirty="0" smtClean="0"/>
-              <a:t>.</a:t>
-            </a:r>
-          </a:p>
-          <a:p>
-            <a:r>
-              <a:rPr lang="fr-FR" dirty="0">
-                <a:hlinkClick r:id="rId2"/>
-              </a:rPr>
-              <a:t>https://</a:t>
-            </a:r>
-            <a:r>
-              <a:rPr lang="fr-FR" dirty="0" smtClean="0">
-                <a:hlinkClick r:id="rId2"/>
-              </a:rPr>
-              <a:t>fr.wikipedia.org/wiki/Al-Khw%C3%A2rizm%C3%AE</a:t>
-            </a:r>
-            <a:endParaRPr lang="fr-FR" dirty="0" smtClean="0"/>
-          </a:p>
-          <a:p>
-            <a:r>
-              <a:rPr lang="fr-FR" dirty="0">
-                <a:hlinkClick r:id="rId3"/>
-              </a:rPr>
-              <a:t>https://fr.wikipedia.org/wiki/Groupe_(math%C3%A9matiques</a:t>
-            </a:r>
-            <a:r>
-              <a:rPr lang="fr-FR" dirty="0" smtClean="0">
-                <a:hlinkClick r:id="rId3"/>
-              </a:rPr>
-              <a:t>)</a:t>
-            </a:r>
-            <a:endParaRPr lang="fr-FR" dirty="0" smtClean="0"/>
-          </a:p>
-          <a:p>
+              <a:rPr lang="fr-FR" dirty="0" err="1" smtClean="0"/>
+              <a:t>should</a:t>
+            </a:r>
+            <a:r>
+              <a:rPr lang="fr-FR" dirty="0" smtClean="0"/>
+              <a:t> </a:t>
+            </a:r>
+            <a:r>
+              <a:rPr lang="fr-FR" dirty="0" err="1" smtClean="0"/>
+              <a:t>be</a:t>
+            </a:r>
+            <a:r>
+              <a:rPr lang="fr-FR" dirty="0" smtClean="0"/>
+              <a:t> an </a:t>
+            </a:r>
+            <a:r>
+              <a:rPr lang="fr-FR" dirty="0" err="1" smtClean="0"/>
+              <a:t>obviousness</a:t>
+            </a:r>
+            <a:r>
+              <a:rPr lang="fr-FR" dirty="0" smtClean="0"/>
+              <a:t> for </a:t>
+            </a:r>
+            <a:r>
+              <a:rPr lang="fr-FR" dirty="0" err="1" smtClean="0"/>
+              <a:t>everyone</a:t>
+            </a:r>
+            <a:r>
+              <a:rPr lang="fr-FR" dirty="0" smtClean="0"/>
+              <a:t>, </a:t>
+            </a:r>
+            <a:r>
+              <a:rPr lang="fr-FR" dirty="0" err="1" smtClean="0"/>
+              <a:t>because</a:t>
+            </a:r>
+            <a:r>
+              <a:rPr lang="fr-FR" dirty="0" smtClean="0"/>
+              <a:t> </a:t>
+            </a:r>
+            <a:r>
+              <a:rPr lang="fr-FR" dirty="0" err="1" smtClean="0"/>
+              <a:t>it’s</a:t>
+            </a:r>
+            <a:r>
+              <a:rPr lang="fr-FR" dirty="0" smtClean="0"/>
+              <a:t> </a:t>
+            </a:r>
+            <a:r>
+              <a:rPr lang="fr-FR" dirty="0" err="1" smtClean="0"/>
+              <a:t>only</a:t>
+            </a:r>
+            <a:r>
+              <a:rPr lang="fr-FR" dirty="0" smtClean="0"/>
+              <a:t> a </a:t>
+            </a:r>
+            <a:r>
+              <a:rPr lang="fr-FR" dirty="0" err="1" smtClean="0"/>
+              <a:t>logical</a:t>
+            </a:r>
+            <a:r>
+              <a:rPr lang="fr-FR" dirty="0" smtClean="0"/>
+              <a:t> </a:t>
+            </a:r>
+            <a:r>
+              <a:rPr lang="fr-FR" dirty="0" err="1" smtClean="0"/>
+              <a:t>concatenation</a:t>
+            </a:r>
+            <a:r>
+              <a:rPr lang="fr-FR" dirty="0" smtClean="0"/>
+              <a:t>, </a:t>
+            </a:r>
+            <a:r>
+              <a:rPr lang="fr-FR" dirty="0" err="1" smtClean="0"/>
+              <a:t>which</a:t>
+            </a:r>
+            <a:r>
+              <a:rPr lang="fr-FR" dirty="0" smtClean="0"/>
+              <a:t> </a:t>
+            </a:r>
+            <a:r>
+              <a:rPr lang="fr-FR" dirty="0" err="1" smtClean="0"/>
+              <a:t>is</a:t>
+            </a:r>
+            <a:r>
+              <a:rPr lang="fr-FR" dirty="0" smtClean="0"/>
+              <a:t> in </a:t>
+            </a:r>
+            <a:r>
+              <a:rPr lang="fr-FR" dirty="0" err="1" smtClean="0"/>
+              <a:t>theroy</a:t>
+            </a:r>
+            <a:r>
+              <a:rPr lang="fr-FR" dirty="0" smtClean="0"/>
+              <a:t> a </a:t>
+            </a:r>
+            <a:r>
+              <a:rPr lang="fr-FR" dirty="0" err="1" smtClean="0"/>
+              <a:t>formality</a:t>
+            </a:r>
+            <a:r>
+              <a:rPr lang="fr-FR" dirty="0" smtClean="0"/>
+              <a:t> of the ‘</a:t>
+            </a:r>
+            <a:r>
+              <a:rPr lang="fr-FR" dirty="0" err="1" smtClean="0"/>
+              <a:t>common</a:t>
+            </a:r>
+            <a:r>
+              <a:rPr lang="fr-FR" dirty="0" smtClean="0"/>
+              <a:t> </a:t>
+            </a:r>
+            <a:r>
+              <a:rPr lang="fr-FR" dirty="0" err="1" smtClean="0"/>
+              <a:t>sense</a:t>
+            </a:r>
+            <a:r>
+              <a:rPr lang="fr-FR" dirty="0" smtClean="0"/>
+              <a:t>’ </a:t>
+            </a:r>
+            <a:r>
+              <a:rPr lang="fr-FR" dirty="0" err="1" smtClean="0"/>
+              <a:t>shared</a:t>
+            </a:r>
+            <a:r>
+              <a:rPr lang="fr-FR" dirty="0" smtClean="0"/>
+              <a:t> by </a:t>
+            </a:r>
+            <a:r>
+              <a:rPr lang="fr-FR" dirty="0" err="1" smtClean="0"/>
+              <a:t>everybody</a:t>
+            </a:r>
+            <a:r>
+              <a:rPr lang="fr-FR" dirty="0" smtClean="0"/>
+              <a:t> » Poincaré</a:t>
+            </a:r>
             <a:endParaRPr lang="fr-FR" dirty="0"/>
           </a:p>
-          <a:p>
-            <a:endParaRPr lang="fr-FR" dirty="0" smtClean="0"/>
-          </a:p>
-          <a:p>
-            <a:endParaRPr lang="fr-FR" dirty="0"/>
+        </p:txBody>
+      </p:sp>
+      <p:sp>
+        <p:nvSpPr>
+          <p:cNvPr id="4" name="Espace réservé du numéro de diapositive 3"/>
+          <p:cNvSpPr>
+            <a:spLocks noGrp="1"/>
+          </p:cNvSpPr>
+          <p:nvPr>
+            <p:ph type="sldNum" sz="quarter" idx="12"/>
+          </p:nvPr>
+        </p:nvSpPr>
+        <p:spPr/>
+        <p:txBody>
+          <a:bodyPr/>
+          <a:lstStyle/>
+          <a:p>
+            <a:fld id="{D57F1E4F-1CFF-5643-939E-217C01CDF565}" type="slidenum">
+              <a:rPr lang="en-US" smtClean="0"/>
+              <a:pPr/>
+              <a:t>12</a:t>
+            </a:fld>
+            <a:endParaRPr lang="en-US" dirty="0"/>
           </a:p>
         </p:txBody>
       </p:sp>
     </p:spTree>
     <p:extLst>
       <p:ext uri="{BB962C8B-B14F-4D97-AF65-F5344CB8AC3E}">
-        <p14:creationId xmlns:p14="http://schemas.microsoft.com/office/powerpoint/2010/main" val="4251621074"/>
+        <p14:creationId xmlns:p14="http://schemas.microsoft.com/office/powerpoint/2010/main" val="2213883594"/>
       </p:ext>
     </p:extLst>
   </p:cSld>
@@ -6159,28 +7000,146 @@
           <a:p>
             <a:r>
               <a:rPr lang="fr-FR" dirty="0" err="1" smtClean="0"/>
-              <a:t>Complex</a:t>
-            </a:r>
-            <a:r>
-              <a:rPr lang="fr-FR" dirty="0" smtClean="0"/>
+              <a:t>Bibliography</a:t>
+            </a:r>
+            <a:endParaRPr lang="fr-FR" dirty="0"/>
+          </a:p>
+        </p:txBody>
+      </p:sp>
+      <p:sp>
+        <p:nvSpPr>
+          <p:cNvPr id="3" name="Espace réservé du contenu 2"/>
+          <p:cNvSpPr>
+            <a:spLocks noGrp="1"/>
+          </p:cNvSpPr>
+          <p:nvPr>
+            <p:ph idx="1"/>
+          </p:nvPr>
+        </p:nvSpPr>
+        <p:spPr/>
+        <p:txBody>
+          <a:bodyPr/>
+          <a:lstStyle/>
+          <a:p>
+            <a:r>
+              <a:rPr lang="fr-FR" dirty="0" smtClean="0"/>
+              <a:t>Podcast Science</a:t>
+            </a:r>
+          </a:p>
+          <a:p>
+            <a:r>
+              <a:rPr lang="fr-FR" dirty="0"/>
+              <a:t>R. </a:t>
+            </a:r>
+            <a:r>
+              <a:rPr lang="fr-FR" dirty="0" err="1"/>
+              <a:t>Herz</a:t>
+            </a:r>
+            <a:r>
+              <a:rPr lang="fr-FR" dirty="0"/>
+              <a:t>-Fischler, A </a:t>
+            </a:r>
+            <a:r>
+              <a:rPr lang="fr-FR" dirty="0" err="1"/>
+              <a:t>Mathematical</a:t>
+            </a:r>
+            <a:r>
+              <a:rPr lang="fr-FR" dirty="0"/>
               <a:t> </a:t>
             </a:r>
             <a:r>
-              <a:rPr lang="fr-FR" dirty="0" err="1" smtClean="0"/>
-              <a:t>Number</a:t>
-            </a:r>
+              <a:rPr lang="fr-FR" dirty="0" err="1"/>
+              <a:t>History</a:t>
+            </a:r>
+            <a:r>
+              <a:rPr lang="fr-FR" dirty="0"/>
+              <a:t> of Division in </a:t>
+            </a:r>
+            <a:r>
+              <a:rPr lang="fr-FR" dirty="0" err="1"/>
+              <a:t>Extreme</a:t>
+            </a:r>
+            <a:r>
+              <a:rPr lang="fr-FR" dirty="0"/>
+              <a:t> and </a:t>
+            </a:r>
+            <a:r>
+              <a:rPr lang="fr-FR" dirty="0" err="1"/>
+              <a:t>Mean</a:t>
+            </a:r>
+            <a:r>
+              <a:rPr lang="fr-FR" dirty="0"/>
+              <a:t> Ratio, Wilfrid Laurier</a:t>
+            </a:r>
+            <a:r>
+              <a:rPr lang="fr-FR" dirty="0" smtClean="0"/>
+              <a:t>.</a:t>
+            </a:r>
+          </a:p>
+          <a:p>
+            <a:r>
+              <a:rPr lang="fr-FR" dirty="0">
+                <a:hlinkClick r:id="rId2"/>
+              </a:rPr>
+              <a:t>https://</a:t>
+            </a:r>
+            <a:r>
+              <a:rPr lang="fr-FR" dirty="0" smtClean="0">
+                <a:hlinkClick r:id="rId2"/>
+              </a:rPr>
+              <a:t>fr.wikipedia.org/wiki/Al-Khw%C3%A2rizm%C3%AE</a:t>
+            </a:r>
+            <a:endParaRPr lang="fr-FR" dirty="0" smtClean="0"/>
+          </a:p>
+          <a:p>
+            <a:r>
+              <a:rPr lang="fr-FR" dirty="0">
+                <a:hlinkClick r:id="rId3"/>
+              </a:rPr>
+              <a:t>https://fr.wikipedia.org/wiki/Groupe_(math%C3%A9matiques</a:t>
+            </a:r>
+            <a:r>
+              <a:rPr lang="fr-FR" dirty="0" smtClean="0">
+                <a:hlinkClick r:id="rId3"/>
+              </a:rPr>
+              <a:t>)</a:t>
+            </a:r>
+            <a:endParaRPr lang="fr-FR" dirty="0" smtClean="0"/>
+          </a:p>
+          <a:p>
+            <a:r>
+              <a:rPr lang="fr-FR" dirty="0">
+                <a:hlinkClick r:id="rId4"/>
+              </a:rPr>
+              <a:t>http://</a:t>
+            </a:r>
+            <a:r>
+              <a:rPr lang="fr-FR" dirty="0" smtClean="0">
+                <a:hlinkClick r:id="rId4"/>
+              </a:rPr>
+              <a:t>images.math.cnrs.fr/Un-concept-mathematique-trois.html</a:t>
+            </a:r>
+            <a:endParaRPr lang="fr-FR" dirty="0" smtClean="0"/>
+          </a:p>
+          <a:p>
             <a:endParaRPr lang="fr-FR" dirty="0"/>
           </a:p>
-        </p:txBody>
-      </p:sp>
-      <p:sp>
-        <p:nvSpPr>
-          <p:cNvPr id="3" name="Espace réservé du contenu 2"/>
-          <p:cNvSpPr>
-            <a:spLocks noGrp="1"/>
-          </p:cNvSpPr>
-          <p:nvPr>
-            <p:ph idx="1"/>
+          <a:p>
+            <a:endParaRPr lang="fr-FR" dirty="0" smtClean="0"/>
+          </a:p>
+          <a:p>
+            <a:endParaRPr lang="fr-FR" dirty="0"/>
+          </a:p>
+        </p:txBody>
+      </p:sp>
+      <p:sp>
+        <p:nvSpPr>
+          <p:cNvPr id="4" name="Espace réservé du numéro de diapositive 3"/>
+          <p:cNvSpPr>
+            <a:spLocks noGrp="1"/>
+          </p:cNvSpPr>
+          <p:nvPr>
+            <p:ph type="sldNum" sz="quarter" idx="12"/>
           </p:nvPr>
         </p:nvSpPr>
         <p:spPr/>
@@ -6188,191 +7147,32 @@
           <a:bodyPr/>
           <a:lstStyle/>
           <a:p>
-            <a:r>
-              <a:rPr lang="fr-FR" dirty="0" smtClean="0"/>
-              <a:t>Tartaglia </a:t>
-            </a:r>
-            <a:r>
-              <a:rPr lang="fr-FR" dirty="0" err="1" smtClean="0"/>
-              <a:t>find</a:t>
-            </a:r>
-            <a:r>
-              <a:rPr lang="fr-FR" dirty="0" smtClean="0"/>
-              <a:t> a </a:t>
-            </a:r>
-            <a:r>
-              <a:rPr lang="fr-FR" dirty="0" err="1" smtClean="0"/>
-              <a:t>way</a:t>
-            </a:r>
-            <a:r>
-              <a:rPr lang="fr-FR" dirty="0" smtClean="0"/>
-              <a:t> to </a:t>
-            </a:r>
-            <a:r>
-              <a:rPr lang="fr-FR" dirty="0" err="1" smtClean="0"/>
-              <a:t>solve</a:t>
-            </a:r>
-            <a:r>
-              <a:rPr lang="fr-FR" dirty="0" smtClean="0"/>
-              <a:t> 3 </a:t>
-            </a:r>
-            <a:r>
-              <a:rPr lang="fr-FR" dirty="0" err="1" smtClean="0"/>
-              <a:t>degrees</a:t>
-            </a:r>
-            <a:r>
-              <a:rPr lang="fr-FR" dirty="0" smtClean="0"/>
-              <a:t> of </a:t>
-            </a:r>
-            <a:r>
-              <a:rPr lang="fr-FR" dirty="0" err="1" smtClean="0"/>
-              <a:t>equations</a:t>
-            </a:r>
-            <a:endParaRPr lang="fr-FR" dirty="0" smtClean="0"/>
-          </a:p>
-          <a:p>
-            <a:r>
-              <a:rPr lang="fr-FR" dirty="0" err="1" smtClean="0"/>
-              <a:t>Sometimes</a:t>
-            </a:r>
-            <a:r>
-              <a:rPr lang="fr-FR" dirty="0" smtClean="0"/>
-              <a:t> in the middle of the </a:t>
-            </a:r>
-            <a:r>
-              <a:rPr lang="fr-FR" dirty="0" err="1" smtClean="0"/>
-              <a:t>calculation</a:t>
-            </a:r>
-            <a:r>
-              <a:rPr lang="fr-FR" dirty="0" smtClean="0"/>
-              <a:t> </a:t>
-            </a:r>
-            <a:r>
-              <a:rPr lang="fr-FR" dirty="0" err="1" smtClean="0"/>
-              <a:t>he</a:t>
-            </a:r>
-            <a:r>
-              <a:rPr lang="fr-FR" dirty="0" smtClean="0"/>
-              <a:t> </a:t>
-            </a:r>
-            <a:r>
-              <a:rPr lang="fr-FR" dirty="0" err="1" smtClean="0"/>
-              <a:t>falls</a:t>
-            </a:r>
-            <a:r>
-              <a:rPr lang="fr-FR" dirty="0" smtClean="0"/>
-              <a:t> of a </a:t>
-            </a:r>
-            <a:r>
-              <a:rPr lang="fr-FR" dirty="0" err="1" smtClean="0"/>
-              <a:t>monster</a:t>
-            </a:r>
-            <a:r>
-              <a:rPr lang="fr-FR" dirty="0" smtClean="0"/>
-              <a:t>.</a:t>
-            </a:r>
-          </a:p>
-          <a:p>
-            <a:r>
-              <a:rPr lang="fr-FR" dirty="0" smtClean="0"/>
-              <a:t>A </a:t>
-            </a:r>
-            <a:r>
-              <a:rPr lang="fr-FR" dirty="0" err="1" smtClean="0"/>
-              <a:t>monster</a:t>
-            </a:r>
-            <a:r>
-              <a:rPr lang="fr-FR" dirty="0" smtClean="0"/>
-              <a:t> </a:t>
-            </a:r>
-            <a:r>
-              <a:rPr lang="fr-FR" dirty="0" err="1" smtClean="0"/>
-              <a:t>is</a:t>
-            </a:r>
-            <a:r>
-              <a:rPr lang="fr-FR" dirty="0" smtClean="0"/>
-              <a:t> a square	</a:t>
-            </a:r>
-            <a:r>
-              <a:rPr lang="fr-FR" dirty="0" err="1" smtClean="0"/>
-              <a:t>root</a:t>
-            </a:r>
-            <a:r>
-              <a:rPr lang="fr-FR" dirty="0" smtClean="0"/>
-              <a:t> of a </a:t>
-            </a:r>
-            <a:r>
-              <a:rPr lang="fr-FR" dirty="0" err="1" smtClean="0"/>
-              <a:t>negative</a:t>
-            </a:r>
-            <a:r>
-              <a:rPr lang="fr-FR" dirty="0" smtClean="0"/>
-              <a:t> </a:t>
-            </a:r>
-            <a:r>
-              <a:rPr lang="fr-FR" dirty="0" err="1" smtClean="0"/>
-              <a:t>number</a:t>
-            </a:r>
-            <a:r>
-              <a:rPr lang="fr-FR" dirty="0" smtClean="0"/>
-              <a:t>.</a:t>
-            </a:r>
-          </a:p>
-          <a:p>
-            <a:r>
-              <a:rPr lang="fr-FR" dirty="0" err="1" smtClean="0"/>
-              <a:t>These</a:t>
-            </a:r>
-            <a:r>
-              <a:rPr lang="fr-FR" dirty="0" smtClean="0"/>
-              <a:t> </a:t>
-            </a:r>
-            <a:r>
-              <a:rPr lang="fr-FR" dirty="0" err="1" smtClean="0"/>
-              <a:t>numbers</a:t>
-            </a:r>
-            <a:r>
-              <a:rPr lang="fr-FR" dirty="0" smtClean="0"/>
-              <a:t> are </a:t>
-            </a:r>
-            <a:r>
-              <a:rPr lang="fr-FR" dirty="0" err="1" smtClean="0"/>
-              <a:t>called</a:t>
-            </a:r>
-            <a:r>
-              <a:rPr lang="fr-FR" dirty="0" smtClean="0"/>
-              <a:t> </a:t>
-            </a:r>
-            <a:r>
-              <a:rPr lang="fr-FR" dirty="0" err="1" smtClean="0"/>
-              <a:t>imaginary</a:t>
-            </a:r>
-            <a:r>
-              <a:rPr lang="fr-FR" dirty="0" smtClean="0"/>
-              <a:t> </a:t>
-            </a:r>
-            <a:r>
-              <a:rPr lang="fr-FR" dirty="0" err="1" smtClean="0"/>
-              <a:t>numbers</a:t>
-            </a:r>
-            <a:r>
-              <a:rPr lang="fr-FR" dirty="0" smtClean="0"/>
-              <a:t>.</a:t>
-            </a:r>
-            <a:endParaRPr lang="fr-FR" dirty="0"/>
+            <a:fld id="{D57F1E4F-1CFF-5643-939E-217C01CDF565}" type="slidenum">
+              <a:rPr lang="en-US" smtClean="0"/>
+              <a:pPr/>
+              <a:t>13</a:t>
+            </a:fld>
+            <a:endParaRPr lang="en-US" dirty="0"/>
           </a:p>
         </p:txBody>
       </p:sp>
     </p:spTree>
     <p:extLst>
       <p:ext uri="{BB962C8B-B14F-4D97-AF65-F5344CB8AC3E}">
-        <p14:creationId xmlns:p14="http://schemas.microsoft.com/office/powerpoint/2010/main" val="2632984137"/>
+        <p14:creationId xmlns:p14="http://schemas.microsoft.com/office/powerpoint/2010/main" val="4251621074"/>
       </p:ext>
     </p:extLst>
   </p:cSld>
   <p:clrMapOvr>
     <a:masterClrMapping/>
   </p:clrMapOvr>
+  <p:timing>
+    <p:tnLst>
+      <p:par>
+        <p:cTn id="1" dur="indefinite" restart="never" nodeType="tmRoot"/>
+      </p:par>
+    </p:tnLst>
+  </p:timing>
 </p:sld>
 </file>
 
@@ -6409,6 +7209,288 @@
           <a:lstStyle/>
           <a:p>
             <a:r>
+              <a:rPr lang="fr-FR" dirty="0" err="1" smtClean="0"/>
+              <a:t>Complex</a:t>
+            </a:r>
+            <a:r>
+              <a:rPr lang="fr-FR" dirty="0" smtClean="0"/>
+              <a:t> </a:t>
+            </a:r>
+            <a:r>
+              <a:rPr lang="fr-FR" dirty="0" err="1" smtClean="0"/>
+              <a:t>Number</a:t>
+            </a:r>
+            <a:endParaRPr lang="fr-FR" dirty="0"/>
+          </a:p>
+        </p:txBody>
+      </p:sp>
+      <p:sp>
+        <p:nvSpPr>
+          <p:cNvPr id="3" name="Espace réservé du contenu 2"/>
+          <p:cNvSpPr>
+            <a:spLocks noGrp="1"/>
+          </p:cNvSpPr>
+          <p:nvPr>
+            <p:ph idx="1"/>
+          </p:nvPr>
+        </p:nvSpPr>
+        <p:spPr/>
+        <p:txBody>
+          <a:bodyPr/>
+          <a:lstStyle/>
+          <a:p>
+            <a:r>
+              <a:rPr lang="fr-FR" dirty="0" smtClean="0"/>
+              <a:t>Tartaglia </a:t>
+            </a:r>
+            <a:r>
+              <a:rPr lang="fr-FR" dirty="0" err="1" smtClean="0"/>
+              <a:t>find</a:t>
+            </a:r>
+            <a:r>
+              <a:rPr lang="fr-FR" dirty="0" smtClean="0"/>
+              <a:t> a </a:t>
+            </a:r>
+            <a:r>
+              <a:rPr lang="fr-FR" dirty="0" err="1" smtClean="0"/>
+              <a:t>way</a:t>
+            </a:r>
+            <a:r>
+              <a:rPr lang="fr-FR" dirty="0" smtClean="0"/>
+              <a:t> to </a:t>
+            </a:r>
+            <a:r>
+              <a:rPr lang="fr-FR" dirty="0" err="1" smtClean="0"/>
+              <a:t>solve</a:t>
+            </a:r>
+            <a:r>
+              <a:rPr lang="fr-FR" dirty="0" smtClean="0"/>
+              <a:t> 3 </a:t>
+            </a:r>
+            <a:r>
+              <a:rPr lang="fr-FR" dirty="0" err="1" smtClean="0"/>
+              <a:t>degrees</a:t>
+            </a:r>
+            <a:r>
+              <a:rPr lang="fr-FR" dirty="0" smtClean="0"/>
+              <a:t> of </a:t>
+            </a:r>
+            <a:r>
+              <a:rPr lang="fr-FR" dirty="0" err="1" smtClean="0"/>
+              <a:t>equations</a:t>
+            </a:r>
+            <a:endParaRPr lang="fr-FR" dirty="0" smtClean="0"/>
+          </a:p>
+          <a:p>
+            <a:r>
+              <a:rPr lang="fr-FR" dirty="0" err="1" smtClean="0"/>
+              <a:t>Sometimes</a:t>
+            </a:r>
+            <a:r>
+              <a:rPr lang="fr-FR" dirty="0" smtClean="0"/>
+              <a:t> in the middle of the </a:t>
+            </a:r>
+            <a:r>
+              <a:rPr lang="fr-FR" dirty="0" err="1" smtClean="0"/>
+              <a:t>calculation</a:t>
+            </a:r>
+            <a:r>
+              <a:rPr lang="fr-FR" dirty="0" smtClean="0"/>
+              <a:t> </a:t>
+            </a:r>
+            <a:r>
+              <a:rPr lang="fr-FR" dirty="0" err="1" smtClean="0"/>
+              <a:t>he</a:t>
+            </a:r>
+            <a:r>
+              <a:rPr lang="fr-FR" dirty="0" smtClean="0"/>
+              <a:t> </a:t>
+            </a:r>
+            <a:r>
+              <a:rPr lang="fr-FR" dirty="0" err="1" smtClean="0"/>
+              <a:t>falls</a:t>
+            </a:r>
+            <a:r>
+              <a:rPr lang="fr-FR" dirty="0" smtClean="0"/>
+              <a:t> of a </a:t>
+            </a:r>
+            <a:r>
+              <a:rPr lang="fr-FR" dirty="0" err="1" smtClean="0"/>
+              <a:t>monster</a:t>
+            </a:r>
+            <a:r>
+              <a:rPr lang="fr-FR" dirty="0" smtClean="0"/>
+              <a:t>.</a:t>
+            </a:r>
+          </a:p>
+          <a:p>
+            <a:r>
+              <a:rPr lang="fr-FR" dirty="0" smtClean="0"/>
+              <a:t>A </a:t>
+            </a:r>
+            <a:r>
+              <a:rPr lang="fr-FR" dirty="0" err="1" smtClean="0"/>
+              <a:t>monster</a:t>
+            </a:r>
+            <a:r>
+              <a:rPr lang="fr-FR" dirty="0" smtClean="0"/>
+              <a:t> </a:t>
+            </a:r>
+            <a:r>
+              <a:rPr lang="fr-FR" dirty="0" err="1" smtClean="0"/>
+              <a:t>is</a:t>
+            </a:r>
+            <a:r>
+              <a:rPr lang="fr-FR" dirty="0" smtClean="0"/>
+              <a:t> a square	</a:t>
+            </a:r>
+            <a:r>
+              <a:rPr lang="fr-FR" dirty="0" err="1" smtClean="0"/>
+              <a:t>root</a:t>
+            </a:r>
+            <a:r>
+              <a:rPr lang="fr-FR" dirty="0" smtClean="0"/>
+              <a:t> of a </a:t>
+            </a:r>
+            <a:r>
+              <a:rPr lang="fr-FR" dirty="0" err="1" smtClean="0"/>
+              <a:t>negative</a:t>
+            </a:r>
+            <a:r>
+              <a:rPr lang="fr-FR" dirty="0" smtClean="0"/>
+              <a:t> </a:t>
+            </a:r>
+            <a:r>
+              <a:rPr lang="fr-FR" dirty="0" err="1" smtClean="0"/>
+              <a:t>number</a:t>
+            </a:r>
+            <a:r>
+              <a:rPr lang="fr-FR" dirty="0" smtClean="0"/>
+              <a:t>.</a:t>
+            </a:r>
+          </a:p>
+          <a:p>
+            <a:r>
+              <a:rPr lang="fr-FR" dirty="0" err="1" smtClean="0"/>
+              <a:t>These</a:t>
+            </a:r>
+            <a:r>
+              <a:rPr lang="fr-FR" dirty="0" smtClean="0"/>
+              <a:t> </a:t>
+            </a:r>
+            <a:r>
+              <a:rPr lang="fr-FR" dirty="0" err="1" smtClean="0"/>
+              <a:t>numbers</a:t>
+            </a:r>
+            <a:r>
+              <a:rPr lang="fr-FR" dirty="0" smtClean="0"/>
+              <a:t> are </a:t>
+            </a:r>
+            <a:r>
+              <a:rPr lang="fr-FR" dirty="0" err="1" smtClean="0"/>
+              <a:t>called</a:t>
+            </a:r>
+            <a:r>
+              <a:rPr lang="fr-FR" dirty="0" smtClean="0"/>
+              <a:t> </a:t>
+            </a:r>
+            <a:r>
+              <a:rPr lang="fr-FR" dirty="0" err="1" smtClean="0"/>
+              <a:t>imaginary</a:t>
+            </a:r>
+            <a:r>
+              <a:rPr lang="fr-FR" dirty="0" smtClean="0"/>
+              <a:t> </a:t>
+            </a:r>
+            <a:r>
+              <a:rPr lang="fr-FR" dirty="0" err="1" smtClean="0"/>
+              <a:t>numbers</a:t>
+            </a:r>
+            <a:r>
+              <a:rPr lang="fr-FR" dirty="0" smtClean="0"/>
+              <a:t>.</a:t>
+            </a:r>
+            <a:endParaRPr lang="fr-FR" dirty="0"/>
+          </a:p>
+        </p:txBody>
+      </p:sp>
+      <p:sp>
+        <p:nvSpPr>
+          <p:cNvPr id="4" name="Espace réservé du numéro de diapositive 3"/>
+          <p:cNvSpPr>
+            <a:spLocks noGrp="1"/>
+          </p:cNvSpPr>
+          <p:nvPr>
+            <p:ph type="sldNum" sz="quarter" idx="12"/>
+          </p:nvPr>
+        </p:nvSpPr>
+        <p:spPr/>
+        <p:txBody>
+          <a:bodyPr/>
+          <a:lstStyle/>
+          <a:p>
+            <a:fld id="{D57F1E4F-1CFF-5643-939E-217C01CDF565}" type="slidenum">
+              <a:rPr lang="en-US" smtClean="0"/>
+              <a:pPr/>
+              <a:t>14</a:t>
+            </a:fld>
+            <a:endParaRPr lang="en-US" dirty="0"/>
+          </a:p>
+        </p:txBody>
+      </p:sp>
+    </p:spTree>
+    <p:extLst>
+      <p:ext uri="{BB962C8B-B14F-4D97-AF65-F5344CB8AC3E}">
+        <p14:creationId xmlns:p14="http://schemas.microsoft.com/office/powerpoint/2010/main" val="2632984137"/>
+      </p:ext>
+    </p:extLst>
+  </p:cSld>
+  <p:clrMapOvr>
+    <a:masterClrMapping/>
+  </p:clrMapOvr>
+  <p:timing>
+    <p:tnLst>
+      <p:par>
+        <p:cTn id="1" dur="indefinite" restart="never" nodeType="tmRoot"/>
+      </p:par>
+    </p:tnLst>
+  </p:timing>
+</p:sld>
+</file>
+
+<file path=ppt/slides/slide15.xml><?xml version="1.0" encoding="utf-8"?>
+<p:sld xmlns:a="http://schemas.openxmlformats.org/drawingml/2006/main" xmlns:r="http://schemas.openxmlformats.org/officeDocument/2006/relationships" xmlns:p="http://schemas.openxmlformats.org/presentationml/2006/main">
+  <p:cSld>
+    <p:spTree>
+      <p:nvGrpSpPr>
+        <p:cNvPr id="1" name=""/>
+        <p:cNvGrpSpPr/>
+        <p:nvPr/>
+      </p:nvGrpSpPr>
+      <p:grpSpPr>
+        <a:xfrm>
+          <a:off x="0" y="0"/>
+          <a:ext cx="0" cy="0"/>
+          <a:chOff x="0" y="0"/>
+          <a:chExt cx="0" cy="0"/>
+        </a:xfrm>
+      </p:grpSpPr>
+      <p:sp>
+        <p:nvSpPr>
+          <p:cNvPr id="2" name="Titre 1"/>
+          <p:cNvSpPr>
+            <a:spLocks noGrp="1"/>
+          </p:cNvSpPr>
+          <p:nvPr>
+            <p:ph type="title"/>
+          </p:nvPr>
+        </p:nvSpPr>
+        <p:spPr/>
+        <p:txBody>
+          <a:bodyPr/>
+          <a:lstStyle/>
+          <a:p>
+            <a:r>
               <a:rPr lang="fr-FR" dirty="0" smtClean="0"/>
               <a:t>Complexe </a:t>
             </a:r>
@@ -6596,6 +7678,30 @@
           <a:p>
             <a:pPr lvl="1"/>
             <a:endParaRPr lang="fr-FR" dirty="0"/>
+          </a:p>
+        </p:txBody>
+      </p:sp>
+      <p:sp>
+        <p:nvSpPr>
+          <p:cNvPr id="4" name="Espace réservé du numéro de diapositive 3"/>
+          <p:cNvSpPr>
+            <a:spLocks noGrp="1"/>
+          </p:cNvSpPr>
+          <p:nvPr>
+            <p:ph type="sldNum" sz="quarter" idx="12"/>
+          </p:nvPr>
+        </p:nvSpPr>
+        <p:spPr/>
+        <p:txBody>
+          <a:bodyPr/>
+          <a:lstStyle/>
+          <a:p>
+            <a:fld id="{D57F1E4F-1CFF-5643-939E-217C01CDF565}" type="slidenum">
+              <a:rPr lang="en-US" smtClean="0"/>
+              <a:pPr/>
+              <a:t>15</a:t>
+            </a:fld>
+            <a:endParaRPr lang="en-US" dirty="0"/>
           </a:p>
         </p:txBody>
       </p:sp>
@@ -6609,6 +7715,13 @@
   <p:clrMapOvr>
     <a:masterClrMapping/>
   </p:clrMapOvr>
+  <p:timing>
+    <p:tnLst>
+      <p:par>
+        <p:cTn id="1" dur="indefinite" restart="never" nodeType="tmRoot"/>
+      </p:par>
+    </p:tnLst>
+  </p:timing>
 </p:sld>
 </file>
 
@@ -6752,6 +7865,30 @@
           </a:p>
           <a:p>
             <a:endParaRPr lang="fr-FR" dirty="0" smtClean="0"/>
+          </a:p>
+        </p:txBody>
+      </p:sp>
+      <p:sp>
+        <p:nvSpPr>
+          <p:cNvPr id="4" name="Espace réservé du numéro de diapositive 3"/>
+          <p:cNvSpPr>
+            <a:spLocks noGrp="1"/>
+          </p:cNvSpPr>
+          <p:nvPr>
+            <p:ph type="sldNum" sz="quarter" idx="12"/>
+          </p:nvPr>
+        </p:nvSpPr>
+        <p:spPr/>
+        <p:txBody>
+          <a:bodyPr/>
+          <a:lstStyle/>
+          <a:p>
+            <a:fld id="{D57F1E4F-1CFF-5643-939E-217C01CDF565}" type="slidenum">
+              <a:rPr lang="en-US" smtClean="0"/>
+              <a:pPr/>
+              <a:t>2</a:t>
+            </a:fld>
+            <a:endParaRPr lang="en-US" dirty="0"/>
           </a:p>
         </p:txBody>
       </p:sp>
@@ -6866,6 +8003,30 @@
           </a:p>
         </p:txBody>
       </p:sp>
+      <p:sp>
+        <p:nvSpPr>
+          <p:cNvPr id="4" name="Espace réservé du numéro de diapositive 3"/>
+          <p:cNvSpPr>
+            <a:spLocks noGrp="1"/>
+          </p:cNvSpPr>
+          <p:nvPr>
+            <p:ph type="sldNum" sz="quarter" idx="12"/>
+          </p:nvPr>
+        </p:nvSpPr>
+        <p:spPr/>
+        <p:txBody>
+          <a:bodyPr/>
+          <a:lstStyle/>
+          <a:p>
+            <a:fld id="{D57F1E4F-1CFF-5643-939E-217C01CDF565}" type="slidenum">
+              <a:rPr lang="en-US" smtClean="0"/>
+              <a:pPr/>
+              <a:t>3</a:t>
+            </a:fld>
+            <a:endParaRPr lang="en-US" dirty="0"/>
+          </a:p>
+        </p:txBody>
+      </p:sp>
     </p:spTree>
     <p:extLst>
       <p:ext uri="{BB962C8B-B14F-4D97-AF65-F5344CB8AC3E}">
@@ -6991,7 +8152,15 @@
             </a:r>
             <a:r>
               <a:rPr lang="fr-FR" dirty="0" smtClean="0"/>
-              <a:t> for the time in the </a:t>
+              <a:t> for </a:t>
+            </a:r>
+            <a:r>
+              <a:rPr lang="fr-FR" dirty="0" smtClean="0"/>
+              <a:t>the first </a:t>
+            </a:r>
+            <a:r>
+              <a:rPr lang="fr-FR" dirty="0" smtClean="0"/>
+              <a:t>time in the </a:t>
             </a:r>
             <a:r>
               <a:rPr lang="fr-FR" dirty="0" err="1" smtClean="0"/>
@@ -7040,6 +8209,30 @@
               <a:t> Ratio »</a:t>
             </a:r>
             <a:endParaRPr lang="fr-FR" dirty="0"/>
+          </a:p>
+        </p:txBody>
+      </p:sp>
+      <p:sp>
+        <p:nvSpPr>
+          <p:cNvPr id="4" name="Espace réservé du numéro de diapositive 3"/>
+          <p:cNvSpPr>
+            <a:spLocks noGrp="1"/>
+          </p:cNvSpPr>
+          <p:nvPr>
+            <p:ph type="sldNum" sz="quarter" idx="12"/>
+          </p:nvPr>
+        </p:nvSpPr>
+        <p:spPr/>
+        <p:txBody>
+          <a:bodyPr/>
+          <a:lstStyle/>
+          <a:p>
+            <a:fld id="{D57F1E4F-1CFF-5643-939E-217C01CDF565}" type="slidenum">
+              <a:rPr lang="en-US" smtClean="0"/>
+              <a:pPr/>
+              <a:t>4</a:t>
+            </a:fld>
+            <a:endParaRPr lang="en-US" dirty="0"/>
           </a:p>
         </p:txBody>
       </p:sp>
@@ -7233,8 +8426,8 @@
           </a:p>
         </p:txBody>
       </p:sp>
-      <mc:AlternateContent xmlns:mc="http://schemas.openxmlformats.org/markup-compatibility/2006">
-        <mc:Choice xmlns:a14="http://schemas.microsoft.com/office/drawing/2010/main" Requires="a14">
+      <mc:AlternateContent xmlns:mc="http://schemas.openxmlformats.org/markup-compatibility/2006" xmlns:a14="http://schemas.microsoft.com/office/drawing/2010/main">
+        <mc:Choice Requires="a14">
           <p:sp>
             <p:nvSpPr>
               <p:cNvPr id="5" name="ZoneTexte 4"/>
@@ -7257,6 +8450,7 @@
               </a:bodyPr>
               <a:lstStyle/>
               <a:p>
+                <a:pPr/>
                 <a14:m>
                   <m:oMathPara xmlns:m="http://schemas.openxmlformats.org/officeDocument/2006/math">
                     <m:oMathParaPr>
@@ -7339,7 +8533,7 @@
             </p:txBody>
           </p:sp>
         </mc:Choice>
-        <mc:Fallback>
+        <mc:Fallback xmlns="">
           <p:sp>
             <p:nvSpPr>
               <p:cNvPr id="5" name="ZoneTexte 4"/>
@@ -7693,6 +8887,30 @@
           </a:p>
         </p:txBody>
       </p:sp>
+      <p:sp>
+        <p:nvSpPr>
+          <p:cNvPr id="3" name="Espace réservé du numéro de diapositive 2"/>
+          <p:cNvSpPr>
+            <a:spLocks noGrp="1"/>
+          </p:cNvSpPr>
+          <p:nvPr>
+            <p:ph type="sldNum" sz="quarter" idx="12"/>
+          </p:nvPr>
+        </p:nvSpPr>
+        <p:spPr/>
+        <p:txBody>
+          <a:bodyPr/>
+          <a:lstStyle/>
+          <a:p>
+            <a:fld id="{D57F1E4F-1CFF-5643-939E-217C01CDF565}" type="slidenum">
+              <a:rPr lang="en-US" smtClean="0"/>
+              <a:pPr/>
+              <a:t>5</a:t>
+            </a:fld>
+            <a:endParaRPr lang="en-US" dirty="0"/>
+          </a:p>
+        </p:txBody>
+      </p:sp>
     </p:spTree>
     <p:extLst>
       <p:ext uri="{BB962C8B-B14F-4D97-AF65-F5344CB8AC3E}">
@@ -7977,6 +9195,30 @@
           </a:p>
         </p:txBody>
       </p:sp>
+      <p:sp>
+        <p:nvSpPr>
+          <p:cNvPr id="5" name="Espace réservé du numéro de diapositive 4"/>
+          <p:cNvSpPr>
+            <a:spLocks noGrp="1"/>
+          </p:cNvSpPr>
+          <p:nvPr>
+            <p:ph type="sldNum" sz="quarter" idx="12"/>
+          </p:nvPr>
+        </p:nvSpPr>
+        <p:spPr/>
+        <p:txBody>
+          <a:bodyPr/>
+          <a:lstStyle/>
+          <a:p>
+            <a:fld id="{D57F1E4F-1CFF-5643-939E-217C01CDF565}" type="slidenum">
+              <a:rPr lang="en-US" smtClean="0"/>
+              <a:pPr/>
+              <a:t>6</a:t>
+            </a:fld>
+            <a:endParaRPr lang="en-US" dirty="0"/>
+          </a:p>
+        </p:txBody>
+      </p:sp>
     </p:spTree>
     <p:extLst>
       <p:ext uri="{BB962C8B-B14F-4D97-AF65-F5344CB8AC3E}">
@@ -8227,6 +9469,30 @@
           </a:p>
         </p:txBody>
       </p:sp>
+      <p:sp>
+        <p:nvSpPr>
+          <p:cNvPr id="4" name="Espace réservé du numéro de diapositive 3"/>
+          <p:cNvSpPr>
+            <a:spLocks noGrp="1"/>
+          </p:cNvSpPr>
+          <p:nvPr>
+            <p:ph type="sldNum" sz="quarter" idx="12"/>
+          </p:nvPr>
+        </p:nvSpPr>
+        <p:spPr/>
+        <p:txBody>
+          <a:bodyPr/>
+          <a:lstStyle/>
+          <a:p>
+            <a:fld id="{D57F1E4F-1CFF-5643-939E-217C01CDF565}" type="slidenum">
+              <a:rPr lang="en-US" smtClean="0"/>
+              <a:pPr/>
+              <a:t>7</a:t>
+            </a:fld>
+            <a:endParaRPr lang="en-US" dirty="0"/>
+          </a:p>
+        </p:txBody>
+      </p:sp>
     </p:spTree>
     <p:extLst>
       <p:ext uri="{BB962C8B-B14F-4D97-AF65-F5344CB8AC3E}">
@@ -8304,11 +9570,34 @@
           <a:p>
             <a:r>
               <a:rPr lang="fr-FR" dirty="0" smtClean="0"/>
-              <a:t>The </a:t>
-            </a:r>
-            <a:r>
-              <a:rPr lang="fr-FR" dirty="0" err="1" smtClean="0"/>
-              <a:t>nineteenth</a:t>
+              <a:t>In 1830, Galois </a:t>
+            </a:r>
+            <a:r>
+              <a:rPr lang="fr-FR" dirty="0" err="1" smtClean="0"/>
+              <a:t>created</a:t>
+            </a:r>
+            <a:r>
+              <a:rPr lang="fr-FR" dirty="0" smtClean="0"/>
+              <a:t> the concept of « </a:t>
+            </a:r>
+            <a:r>
+              <a:rPr lang="fr-FR" dirty="0" smtClean="0"/>
+              <a:t>group</a:t>
+            </a:r>
+            <a:r>
+              <a:rPr lang="fr-FR" dirty="0" smtClean="0"/>
+              <a:t> »</a:t>
+            </a:r>
+          </a:p>
+          <a:p>
+            <a:pPr lvl="1"/>
+            <a:r>
+              <a:rPr lang="fr-FR" dirty="0" smtClean="0"/>
+              <a:t>For </a:t>
+            </a:r>
+            <a:r>
+              <a:rPr lang="fr-FR" dirty="0" err="1" smtClean="0"/>
+              <a:t>solving</a:t>
             </a:r>
             <a:r>
               <a:rPr lang="fr-FR" dirty="0" smtClean="0"/>
@@ -8316,30 +9605,43 @@
             </a:r>
             <a:r>
               <a:rPr lang="fr-FR" dirty="0" err="1" smtClean="0"/>
-              <a:t>century</a:t>
-            </a:r>
-            <a:r>
-              <a:rPr lang="fr-FR" dirty="0" smtClean="0"/>
-              <a:t> : Galois </a:t>
-            </a:r>
-            <a:r>
-              <a:rPr lang="fr-FR" dirty="0" err="1" smtClean="0"/>
-              <a:t>created</a:t>
-            </a:r>
-            <a:r>
-              <a:rPr lang="fr-FR" dirty="0" smtClean="0"/>
-              <a:t> the concept of « group  »</a:t>
-            </a:r>
+              <a:t>equations</a:t>
+            </a:r>
+            <a:r>
+              <a:rPr lang="fr-FR" dirty="0" smtClean="0"/>
+              <a:t> of </a:t>
+            </a:r>
+            <a:r>
+              <a:rPr lang="fr-FR" dirty="0" err="1" smtClean="0"/>
+              <a:t>higher</a:t>
+            </a:r>
+            <a:r>
+              <a:rPr lang="fr-FR" dirty="0" smtClean="0"/>
+              <a:t> </a:t>
+            </a:r>
+            <a:r>
+              <a:rPr lang="fr-FR" dirty="0" err="1" smtClean="0"/>
+              <a:t>degree</a:t>
+            </a:r>
+            <a:endParaRPr lang="fr-FR" dirty="0" smtClean="0"/>
           </a:p>
           <a:p>
             <a:pPr lvl="1"/>
             <a:r>
               <a:rPr lang="fr-FR" dirty="0" smtClean="0"/>
-              <a:t>For </a:t>
-            </a:r>
-            <a:r>
-              <a:rPr lang="fr-FR" dirty="0" err="1" smtClean="0"/>
-              <a:t>solving</a:t>
+              <a:t>Open the </a:t>
+            </a:r>
+            <a:r>
+              <a:rPr lang="fr-FR" dirty="0" err="1" smtClean="0"/>
+              <a:t>way</a:t>
+            </a:r>
+            <a:r>
+              <a:rPr lang="fr-FR" dirty="0" smtClean="0"/>
+              <a:t> to a lot of </a:t>
+            </a:r>
+            <a:r>
+              <a:rPr lang="fr-FR" dirty="0" err="1" smtClean="0"/>
+              <a:t>derived</a:t>
             </a:r>
             <a:r>
               <a:rPr lang="fr-FR" dirty="0" smtClean="0"/>
@@ -8347,50 +9649,6 @@
             </a:r>
             <a:r>
               <a:rPr lang="fr-FR" dirty="0" err="1" smtClean="0"/>
-              <a:t>equations</a:t>
-            </a:r>
-            <a:r>
-              <a:rPr lang="fr-FR" dirty="0" smtClean="0"/>
-              <a:t> of </a:t>
-            </a:r>
-            <a:r>
-              <a:rPr lang="fr-FR" dirty="0" err="1" smtClean="0"/>
-              <a:t>higher</a:t>
-            </a:r>
-            <a:r>
-              <a:rPr lang="fr-FR" dirty="0" smtClean="0"/>
-              <a:t> </a:t>
-            </a:r>
-            <a:r>
-              <a:rPr lang="fr-FR" dirty="0" err="1" smtClean="0"/>
-              <a:t>degree</a:t>
-            </a:r>
-            <a:endParaRPr lang="fr-FR" dirty="0" smtClean="0"/>
-          </a:p>
-          <a:p>
-            <a:pPr lvl="1"/>
-            <a:r>
-              <a:rPr lang="fr-FR" dirty="0" smtClean="0"/>
-              <a:t>Open the </a:t>
-            </a:r>
-            <a:r>
-              <a:rPr lang="fr-FR" dirty="0" err="1" smtClean="0"/>
-              <a:t>way</a:t>
-            </a:r>
-            <a:r>
-              <a:rPr lang="fr-FR" dirty="0" smtClean="0"/>
-              <a:t> to a lot of </a:t>
-            </a:r>
-            <a:r>
-              <a:rPr lang="fr-FR" dirty="0" err="1" smtClean="0"/>
-              <a:t>derived</a:t>
-            </a:r>
-            <a:r>
-              <a:rPr lang="fr-FR" dirty="0" smtClean="0"/>
-              <a:t> </a:t>
-            </a:r>
-            <a:r>
-              <a:rPr lang="fr-FR" dirty="0" err="1" smtClean="0"/>
               <a:t>object</a:t>
             </a:r>
             <a:r>
@@ -8406,6 +9664,30 @@
               <a:t>, division ring</a:t>
             </a:r>
             <a:endParaRPr lang="fr-FR" dirty="0"/>
+          </a:p>
+        </p:txBody>
+      </p:sp>
+      <p:sp>
+        <p:nvSpPr>
+          <p:cNvPr id="4" name="Espace réservé du numéro de diapositive 3"/>
+          <p:cNvSpPr>
+            <a:spLocks noGrp="1"/>
+          </p:cNvSpPr>
+          <p:nvPr>
+            <p:ph type="sldNum" sz="quarter" idx="12"/>
+          </p:nvPr>
+        </p:nvSpPr>
+        <p:spPr/>
+        <p:txBody>
+          <a:bodyPr/>
+          <a:lstStyle/>
+          <a:p>
+            <a:fld id="{D57F1E4F-1CFF-5643-939E-217C01CDF565}" type="slidenum">
+              <a:rPr lang="en-US" smtClean="0"/>
+              <a:pPr/>
+              <a:t>8</a:t>
+            </a:fld>
+            <a:endParaRPr lang="en-US" dirty="0"/>
           </a:p>
         </p:txBody>
       </p:sp>
@@ -8419,6 +9701,13 @@
   <p:clrMapOvr>
     <a:masterClrMapping/>
   </p:clrMapOvr>
+  <p:timing>
+    <p:tnLst>
+      <p:par>
+        <p:cTn id="1" dur="indefinite" restart="never" nodeType="tmRoot"/>
+      </p:par>
+    </p:tnLst>
+  </p:timing>
 </p:sld>
 </file>
 
@@ -8592,6 +9881,30 @@
           </a:extLst>
         </p:spPr>
       </p:pic>
+      <p:sp>
+        <p:nvSpPr>
+          <p:cNvPr id="4" name="Espace réservé du numéro de diapositive 3"/>
+          <p:cNvSpPr>
+            <a:spLocks noGrp="1"/>
+          </p:cNvSpPr>
+          <p:nvPr>
+            <p:ph type="sldNum" sz="quarter" idx="12"/>
+          </p:nvPr>
+        </p:nvSpPr>
+        <p:spPr/>
+        <p:txBody>
+          <a:bodyPr/>
+          <a:lstStyle/>
+          <a:p>
+            <a:fld id="{D57F1E4F-1CFF-5643-939E-217C01CDF565}" type="slidenum">
+              <a:rPr lang="en-US" smtClean="0"/>
+              <a:pPr/>
+              <a:t>9</a:t>
+            </a:fld>
+            <a:endParaRPr lang="en-US" dirty="0"/>
+          </a:p>
+        </p:txBody>
+      </p:sp>
     </p:spTree>
     <p:extLst>
       <p:ext uri="{BB962C8B-B14F-4D97-AF65-F5344CB8AC3E}">
@@ -8602,6 +9915,13 @@
   <p:clrMapOvr>
     <a:masterClrMapping/>
   </p:clrMapOvr>
+  <p:timing>
+    <p:tnLst>
+      <p:par>
+        <p:cTn id="1" dur="indefinite" restart="never" nodeType="tmRoot"/>
+      </p:par>
+    </p:tnLst>
+  </p:timing>
 </p:sld>
 </file>
 
@@ -8840,4 +10160,526 @@
     </a:ext>
   </a:extLst>
 </a:theme>
+</file>
+
+<file path=ppt/theme/theme2.xml><?xml version="1.0" encoding="utf-8"?>
+<a:theme xmlns:a="http://schemas.openxmlformats.org/drawingml/2006/main" name="Thème Office">
+  <a:themeElements>
+    <a:clrScheme name="Office">
+      <a:dk1>
+        <a:sysClr val="windowText" lastClr="000000"/>
+      </a:dk1>
+      <a:lt1>
+        <a:sysClr val="window" lastClr="FFFFFF"/>
+      </a:lt1>
+      <a:dk2>
+        <a:srgbClr val="44546A"/>
+      </a:dk2>
+      <a:lt2>
+        <a:srgbClr val="E7E6E6"/>
+      </a:lt2>
+      <a:accent1>
+        <a:srgbClr val="5B9BD5"/>
+      </a:accent1>
+      <a:accent2>
+        <a:srgbClr val="ED7D31"/>
+      </a:accent2>
+      <a:accent3>
+        <a:srgbClr val="A5A5A5"/>
+      </a:accent3>
+      <a:accent4>
+        <a:srgbClr val="FFC000"/>
+      </a:accent4>
+      <a:accent5>
+        <a:srgbClr val="4472C4"/>
+      </a:accent5>
+      <a:accent6>
+        <a:srgbClr val="70AD47"/>
+      </a:accent6>
+      <a:hlink>
+        <a:srgbClr val="0563C1"/>
+      </a:hlink>
+      <a:folHlink>
+        <a:srgbClr val="954F72"/>
+      </a:folHlink>
+    </a:clrScheme>
+    <a:fontScheme name="Office">
+      <a:majorFont>
+        <a:latin typeface="Calibri Light" panose="020F0302020204030204"/>
+        <a:ea typeface=""/>
+        <a:cs typeface=""/>
+        <a:font script="Jpan" typeface="游ゴシック Light"/>
+        <a:font script="Hang" typeface="맑은 고딕"/>
+        <a:font script="Hans" typeface="等线 Light"/>
+        <a:font script="Hant" typeface="新細明體"/>
+        <a:font script="Arab" typeface="Times New Roman"/>
+        <a:font script="Hebr" typeface="Times New Roman"/>
+        <a:font script="Thai" typeface="Angsana New"/>
+        <a:font script="Ethi" typeface="Nyala"/>
+        <a:font script="Beng" typeface="Vrinda"/>
+        <a:font script="Gujr" typeface="Shruti"/>
+        <a:font script="Khmr" typeface="MoolBoran"/>
+        <a:font script="Knda" typeface="Tunga"/>
+        <a:font script="Guru" typeface="Raavi"/>
+        <a:font script="Cans" typeface="Euphemia"/>
+        <a:font script="Cher" typeface="Plantagenet Cherokee"/>
+        <a:font script="Yiii" typeface="Microsoft Yi Baiti"/>
+        <a:font script="Tibt" typeface="Microsoft Himalaya"/>
+        <a:font script="Thaa" typeface="MV Boli"/>
+        <a:font script="Deva" typeface="Mangal"/>
+        <a:font script="Telu" typeface="Gautami"/>
+        <a:font script="Taml" typeface="Latha"/>
+        <a:font script="Syrc" typeface="Estrangelo Edessa"/>
+        <a:font script="Orya" typeface="Kalinga"/>
+        <a:font script="Mlym" typeface="Kartika"/>
+        <a:font script="Laoo" typeface="DokChampa"/>
+        <a:font script="Sinh" typeface="Iskoola Pota"/>
+        <a:font script="Mong" typeface="Mongolian Baiti"/>
+        <a:font script="Viet" typeface="Times New Roman"/>
+        <a:font script="Uigh" typeface="Microsoft Uighur"/>
+        <a:font script="Geor" typeface="Sylfaen"/>
+      </a:majorFont>
+      <a:minorFont>
+        <a:latin typeface="Calibri" panose="020F0502020204030204"/>
+        <a:ea typeface=""/>
+        <a:cs typeface=""/>
+        <a:font script="Jpan" typeface="游ゴシック"/>
+        <a:font script="Hang" typeface="맑은 고딕"/>
+        <a:font script="Hans" typeface="等线"/>
+        <a:font script="Hant" typeface="新細明體"/>
+        <a:font script="Arab" typeface="Arial"/>
+        <a:font script="Hebr" typeface="Arial"/>
+        <a:font script="Thai" typeface="Cordia New"/>
+        <a:font script="Ethi" typeface="Nyala"/>
+        <a:font script="Beng" typeface="Vrinda"/>
+        <a:font script="Gujr" typeface="Shruti"/>
+        <a:font script="Khmr" typeface="DaunPenh"/>
+        <a:font script="Knda" typeface="Tunga"/>
+        <a:font script="Guru" typeface="Raavi"/>
+        <a:font script="Cans" typeface="Euphemia"/>
+        <a:font script="Cher" typeface="Plantagenet Cherokee"/>
+        <a:font script="Yiii" typeface="Microsoft Yi Baiti"/>
+        <a:font script="Tibt" typeface="Microsoft Himalaya"/>
+        <a:font script="Thaa" typeface="MV Boli"/>
+        <a:font script="Deva" typeface="Mangal"/>
+        <a:font script="Telu" typeface="Gautami"/>
+        <a:font script="Taml" typeface="Latha"/>
+        <a:font script="Syrc" typeface="Estrangelo Edessa"/>
+        <a:font script="Orya" typeface="Kalinga"/>
+        <a:font script="Mlym" typeface="Kartika"/>
+        <a:font script="Laoo" typeface="DokChampa"/>
+        <a:font script="Sinh" typeface="Iskoola Pota"/>
+        <a:font script="Mong" typeface="Mongolian Baiti"/>
+        <a:font script="Viet" typeface="Arial"/>
+        <a:font script="Uigh" typeface="Microsoft Uighur"/>
+        <a:font script="Geor" typeface="Sylfaen"/>
+      </a:minorFont>
+    </a:fontScheme>
+    <a:fmtScheme name="Office">
+      <a:fillStyleLst>
+        <a:solidFill>
+          <a:schemeClr val="phClr"/>
+        </a:solidFill>
+        <a:gradFill rotWithShape="1">
+          <a:gsLst>
+            <a:gs pos="0">
+              <a:schemeClr val="phClr">
+                <a:lumMod val="110000"/>
+                <a:satMod val="105000"/>
+                <a:tint val="67000"/>
+              </a:schemeClr>
+            </a:gs>
+            <a:gs pos="50000">
+              <a:schemeClr val="phClr">
+                <a:lumMod val="105000"/>
+                <a:satMod val="103000"/>
+                <a:tint val="73000"/>
+              </a:schemeClr>
+            </a:gs>
+            <a:gs pos="100000">
+              <a:schemeClr val="phClr">
+                <a:lumMod val="105000"/>
+                <a:satMod val="109000"/>
+                <a:tint val="81000"/>
+              </a:schemeClr>
+            </a:gs>
+          </a:gsLst>
+          <a:lin ang="5400000" scaled="0"/>
+        </a:gradFill>
+        <a:gradFill rotWithShape="1">
+          <a:gsLst>
+            <a:gs pos="0">
+              <a:schemeClr val="phClr">
+                <a:satMod val="103000"/>
+                <a:lumMod val="102000"/>
+                <a:tint val="94000"/>
+              </a:schemeClr>
+            </a:gs>
+            <a:gs pos="50000">
+              <a:schemeClr val="phClr">
+                <a:satMod val="110000"/>
+                <a:lumMod val="100000"/>
+                <a:shade val="100000"/>
+              </a:schemeClr>
+            </a:gs>
+            <a:gs pos="100000">
+              <a:schemeClr val="phClr">
+                <a:lumMod val="99000"/>
+                <a:satMod val="120000"/>
+                <a:shade val="78000"/>
+              </a:schemeClr>
+            </a:gs>
+          </a:gsLst>
+          <a:lin ang="5400000" scaled="0"/>
+        </a:gradFill>
+      </a:fillStyleLst>
+      <a:lnStyleLst>
+        <a:ln w="6350" cap="flat" cmpd="sng" algn="ctr">
+          <a:solidFill>
+            <a:schemeClr val="phClr"/>
+          </a:solidFill>
+          <a:prstDash val="solid"/>
+          <a:miter lim="800000"/>
+        </a:ln>
+        <a:ln w="12700" cap="flat" cmpd="sng" algn="ctr">
+          <a:solidFill>
+            <a:schemeClr val="phClr"/>
+          </a:solidFill>
+          <a:prstDash val="solid"/>
+          <a:miter lim="800000"/>
+        </a:ln>
+        <a:ln w="19050" cap="flat" cmpd="sng" algn="ctr">
+          <a:solidFill>
+            <a:schemeClr val="phClr"/>
+          </a:solidFill>
+          <a:prstDash val="solid"/>
+          <a:miter lim="800000"/>
+        </a:ln>
+      </a:lnStyleLst>
+      <a:effectStyleLst>
+        <a:effectStyle>
+          <a:effectLst/>
+        </a:effectStyle>
+        <a:effectStyle>
+          <a:effectLst/>
+        </a:effectStyle>
+        <a:effectStyle>
+          <a:effectLst>
+            <a:outerShdw blurRad="57150" dist="19050" dir="5400000" algn="ctr" rotWithShape="0">
+              <a:srgbClr val="000000">
+                <a:alpha val="63000"/>
+              </a:srgbClr>
+            </a:outerShdw>
+          </a:effectLst>
+        </a:effectStyle>
+      </a:effectStyleLst>
+      <a:bgFillStyleLst>
+        <a:solidFill>
+          <a:schemeClr val="phClr"/>
+        </a:solidFill>
+        <a:solidFill>
+          <a:schemeClr val="phClr">
+            <a:tint val="95000"/>
+            <a:satMod val="170000"/>
+          </a:schemeClr>
+        </a:solidFill>
+        <a:gradFill rotWithShape="1">
+          <a:gsLst>
+            <a:gs pos="0">
+              <a:schemeClr val="phClr">
+                <a:tint val="93000"/>
+                <a:satMod val="150000"/>
+                <a:shade val="98000"/>
+                <a:lumMod val="102000"/>
+              </a:schemeClr>
+            </a:gs>
+            <a:gs pos="50000">
+              <a:schemeClr val="phClr">
+                <a:tint val="98000"/>
+                <a:satMod val="130000"/>
+                <a:shade val="90000"/>
+                <a:lumMod val="103000"/>
+              </a:schemeClr>
+            </a:gs>
+            <a:gs pos="100000">
+              <a:schemeClr val="phClr">
+                <a:shade val="63000"/>
+                <a:satMod val="120000"/>
+              </a:schemeClr>
+            </a:gs>
+          </a:gsLst>
+          <a:lin ang="5400000" scaled="0"/>
+        </a:gradFill>
+      </a:bgFillStyleLst>
+    </a:fmtScheme>
+  </a:themeElements>
+  <a:objectDefaults/>
+  <a:extraClrSchemeLst/>
+  <a:extLst>
+    <a:ext uri="{05A4C25C-085E-4340-85A3-A5531E510DB2}">
+      <thm15:themeFamily xmlns:thm15="http://schemas.microsoft.com/office/thememl/2012/main" name="Office Theme" id="{62F939B6-93AF-4DB8-9C6B-D6C7DFDC589F}" vid="{4A3C46E8-61CC-4603-A589-7422A47A8E4A}"/>
+    </a:ext>
+  </a:extLst>
+</a:theme>
+</file>
+
+<file path=ppt/theme/theme3.xml><?xml version="1.0" encoding="utf-8"?>
+<a:theme xmlns:a="http://schemas.openxmlformats.org/drawingml/2006/main" name="Thème Office">
+  <a:themeElements>
+    <a:clrScheme name="Office">
+      <a:dk1>
+        <a:sysClr val="windowText" lastClr="000000"/>
+      </a:dk1>
+      <a:lt1>
+        <a:sysClr val="window" lastClr="FFFFFF"/>
+      </a:lt1>
+      <a:dk2>
+        <a:srgbClr val="44546A"/>
+      </a:dk2>
+      <a:lt2>
+        <a:srgbClr val="E7E6E6"/>
+      </a:lt2>
+      <a:accent1>
+        <a:srgbClr val="5B9BD5"/>
+      </a:accent1>
+      <a:accent2>
+        <a:srgbClr val="ED7D31"/>
+      </a:accent2>
+      <a:accent3>
+        <a:srgbClr val="A5A5A5"/>
+      </a:accent3>
+      <a:accent4>
+        <a:srgbClr val="FFC000"/>
+      </a:accent4>
+      <a:accent5>
+        <a:srgbClr val="4472C4"/>
+      </a:accent5>
+      <a:accent6>
+        <a:srgbClr val="70AD47"/>
+      </a:accent6>
+      <a:hlink>
+        <a:srgbClr val="0563C1"/>
+      </a:hlink>
+      <a:folHlink>
+        <a:srgbClr val="954F72"/>
+      </a:folHlink>
+    </a:clrScheme>
+    <a:fontScheme name="Office">
+      <a:majorFont>
+        <a:latin typeface="Calibri Light" panose="020F0302020204030204"/>
+        <a:ea typeface=""/>
+        <a:cs typeface=""/>
+        <a:font script="Jpan" typeface="游ゴシック Light"/>
+        <a:font script="Hang" typeface="맑은 고딕"/>
+        <a:font script="Hans" typeface="等线 Light"/>
+        <a:font script="Hant" typeface="新細明體"/>
+        <a:font script="Arab" typeface="Times New Roman"/>
+        <a:font script="Hebr" typeface="Times New Roman"/>
+        <a:font script="Thai" typeface="Angsana New"/>
+        <a:font script="Ethi" typeface="Nyala"/>
+        <a:font script="Beng" typeface="Vrinda"/>
+        <a:font script="Gujr" typeface="Shruti"/>
+        <a:font script="Khmr" typeface="MoolBoran"/>
+        <a:font script="Knda" typeface="Tunga"/>
+        <a:font script="Guru" typeface="Raavi"/>
+        <a:font script="Cans" typeface="Euphemia"/>
+        <a:font script="Cher" typeface="Plantagenet Cherokee"/>
+        <a:font script="Yiii" typeface="Microsoft Yi Baiti"/>
+        <a:font script="Tibt" typeface="Microsoft Himalaya"/>
+        <a:font script="Thaa" typeface="MV Boli"/>
+        <a:font script="Deva" typeface="Mangal"/>
+        <a:font script="Telu" typeface="Gautami"/>
+        <a:font script="Taml" typeface="Latha"/>
+        <a:font script="Syrc" typeface="Estrangelo Edessa"/>
+        <a:font script="Orya" typeface="Kalinga"/>
+        <a:font script="Mlym" typeface="Kartika"/>
+        <a:font script="Laoo" typeface="DokChampa"/>
+        <a:font script="Sinh" typeface="Iskoola Pota"/>
+        <a:font script="Mong" typeface="Mongolian Baiti"/>
+        <a:font script="Viet" typeface="Times New Roman"/>
+        <a:font script="Uigh" typeface="Microsoft Uighur"/>
+        <a:font script="Geor" typeface="Sylfaen"/>
+      </a:majorFont>
+      <a:minorFont>
+        <a:latin typeface="Calibri" panose="020F0502020204030204"/>
+        <a:ea typeface=""/>
+        <a:cs typeface=""/>
+        <a:font script="Jpan" typeface="游ゴシック"/>
+        <a:font script="Hang" typeface="맑은 고딕"/>
+        <a:font script="Hans" typeface="等线"/>
+        <a:font script="Hant" typeface="新細明體"/>
+        <a:font script="Arab" typeface="Arial"/>
+        <a:font script="Hebr" typeface="Arial"/>
+        <a:font script="Thai" typeface="Cordia New"/>
+        <a:font script="Ethi" typeface="Nyala"/>
+        <a:font script="Beng" typeface="Vrinda"/>
+        <a:font script="Gujr" typeface="Shruti"/>
+        <a:font script="Khmr" typeface="DaunPenh"/>
+        <a:font script="Knda" typeface="Tunga"/>
+        <a:font script="Guru" typeface="Raavi"/>
+        <a:font script="Cans" typeface="Euphemia"/>
+        <a:font script="Cher" typeface="Plantagenet Cherokee"/>
+        <a:font script="Yiii" typeface="Microsoft Yi Baiti"/>
+        <a:font script="Tibt" typeface="Microsoft Himalaya"/>
+        <a:font script="Thaa" typeface="MV Boli"/>
+        <a:font script="Deva" typeface="Mangal"/>
+        <a:font script="Telu" typeface="Gautami"/>
+        <a:font script="Taml" typeface="Latha"/>
+        <a:font script="Syrc" typeface="Estrangelo Edessa"/>
+        <a:font script="Orya" typeface="Kalinga"/>
+        <a:font script="Mlym" typeface="Kartika"/>
+        <a:font script="Laoo" typeface="DokChampa"/>
+        <a:font script="Sinh" typeface="Iskoola Pota"/>
+        <a:font script="Mong" typeface="Mongolian Baiti"/>
+        <a:font script="Viet" typeface="Arial"/>
+        <a:font script="Uigh" typeface="Microsoft Uighur"/>
+        <a:font script="Geor" typeface="Sylfaen"/>
+      </a:minorFont>
+    </a:fontScheme>
+    <a:fmtScheme name="Office">
+      <a:fillStyleLst>
+        <a:solidFill>
+          <a:schemeClr val="phClr"/>
+        </a:solidFill>
+        <a:gradFill rotWithShape="1">
+          <a:gsLst>
+            <a:gs pos="0">
+              <a:schemeClr val="phClr">
+                <a:lumMod val="110000"/>
+                <a:satMod val="105000"/>
+                <a:tint val="67000"/>
+              </a:schemeClr>
+            </a:gs>
+            <a:gs pos="50000">
+              <a:schemeClr val="phClr">
+                <a:lumMod val="105000"/>
+                <a:satMod val="103000"/>
+                <a:tint val="73000"/>
+              </a:schemeClr>
+            </a:gs>
+            <a:gs pos="100000">
+              <a:schemeClr val="phClr">
+                <a:lumMod val="105000"/>
+                <a:satMod val="109000"/>
+                <a:tint val="81000"/>
+              </a:schemeClr>
+            </a:gs>
+          </a:gsLst>
+          <a:lin ang="5400000" scaled="0"/>
+        </a:gradFill>
+        <a:gradFill rotWithShape="1">
+          <a:gsLst>
+            <a:gs pos="0">
+              <a:schemeClr val="phClr">
+                <a:satMod val="103000"/>
+                <a:lumMod val="102000"/>
+                <a:tint val="94000"/>
+              </a:schemeClr>
+            </a:gs>
+            <a:gs pos="50000">
+              <a:schemeClr val="phClr">
+                <a:satMod val="110000"/>
+                <a:lumMod val="100000"/>
+                <a:shade val="100000"/>
+              </a:schemeClr>
+            </a:gs>
+            <a:gs pos="100000">
+              <a:schemeClr val="phClr">
+                <a:lumMod val="99000"/>
+                <a:satMod val="120000"/>
+                <a:shade val="78000"/>
+              </a:schemeClr>
+            </a:gs>
+          </a:gsLst>
+          <a:lin ang="5400000" scaled="0"/>
+        </a:gradFill>
+      </a:fillStyleLst>
+      <a:lnStyleLst>
+        <a:ln w="6350" cap="flat" cmpd="sng" algn="ctr">
+          <a:solidFill>
+            <a:schemeClr val="phClr"/>
+          </a:solidFill>
+          <a:prstDash val="solid"/>
+          <a:miter lim="800000"/>
+        </a:ln>
+        <a:ln w="12700" cap="flat" cmpd="sng" algn="ctr">
+          <a:solidFill>
+            <a:schemeClr val="phClr"/>
+          </a:solidFill>
+          <a:prstDash val="solid"/>
+          <a:miter lim="800000"/>
+        </a:ln>
+        <a:ln w="19050" cap="flat" cmpd="sng" algn="ctr">
+          <a:solidFill>
+            <a:schemeClr val="phClr"/>
+          </a:solidFill>
+          <a:prstDash val="solid"/>
+          <a:miter lim="800000"/>
+        </a:ln>
+      </a:lnStyleLst>
+      <a:effectStyleLst>
+        <a:effectStyle>
+          <a:effectLst/>
+        </a:effectStyle>
+        <a:effectStyle>
+          <a:effectLst/>
+        </a:effectStyle>
+        <a:effectStyle>
+          <a:effectLst>
+            <a:outerShdw blurRad="57150" dist="19050" dir="5400000" algn="ctr" rotWithShape="0">
+              <a:srgbClr val="000000">
+                <a:alpha val="63000"/>
+              </a:srgbClr>
+            </a:outerShdw>
+          </a:effectLst>
+        </a:effectStyle>
+      </a:effectStyleLst>
+      <a:bgFillStyleLst>
+        <a:solidFill>
+          <a:schemeClr val="phClr"/>
+        </a:solidFill>
+        <a:solidFill>
+          <a:schemeClr val="phClr">
+            <a:tint val="95000"/>
+            <a:satMod val="170000"/>
+          </a:schemeClr>
+        </a:solidFill>
+        <a:gradFill rotWithShape="1">
+          <a:gsLst>
+            <a:gs pos="0">
+              <a:schemeClr val="phClr">
+                <a:tint val="93000"/>
+                <a:satMod val="150000"/>
+                <a:shade val="98000"/>
+                <a:lumMod val="102000"/>
+              </a:schemeClr>
+            </a:gs>
+            <a:gs pos="50000">
+              <a:schemeClr val="phClr">
+                <a:tint val="98000"/>
+                <a:satMod val="130000"/>
+                <a:shade val="90000"/>
+                <a:lumMod val="103000"/>
+              </a:schemeClr>
+            </a:gs>
+            <a:gs pos="100000">
+              <a:schemeClr val="phClr">
+                <a:shade val="63000"/>
+                <a:satMod val="120000"/>
+              </a:schemeClr>
+            </a:gs>
+          </a:gsLst>
+          <a:lin ang="5400000" scaled="0"/>
+        </a:gradFill>
+      </a:bgFillStyleLst>
+    </a:fmtScheme>
+  </a:themeElements>
+  <a:objectDefaults/>
+  <a:extraClrSchemeLst/>
+  <a:extLst>
+    <a:ext uri="{05A4C25C-085E-4340-85A3-A5531E510DB2}">
+      <thm15:themeFamily xmlns:thm15="http://schemas.microsoft.com/office/thememl/2012/main" name="Office Theme" id="{62F939B6-93AF-4DB8-9C6B-D6C7DFDC589F}" vid="{4A3C46E8-61CC-4603-A589-7422A47A8E4A}"/>
+    </a:ext>
+  </a:extLst>
+</a:theme>
 </file>
</xml_diff>